<commit_message>
Upload new version of PowerPoint
</commit_message>
<xml_diff>
--- a/Beer Restaurant Success.pptx
+++ b/Beer Restaurant Success.pptx
@@ -28,16 +28,19 @@
     <p:sldId id="273" r:id="rId23"/>
     <p:sldId id="274" r:id="rId24"/>
     <p:sldId id="275" r:id="rId25"/>
+    <p:sldId id="276" r:id="rId26"/>
+    <p:sldId id="277" r:id="rId27"/>
+    <p:sldId id="278" r:id="rId28"/>
   </p:sldIdLst>
   <p:sldSz cy="5143500" cx="9144000"/>
   <p:notesSz cx="6858000" cy="9144000"/>
   <p:embeddedFontLst>
     <p:embeddedFont>
       <p:font typeface="Nunito"/>
-      <p:regular r:id="rId26"/>
-      <p:bold r:id="rId27"/>
-      <p:italic r:id="rId28"/>
-      <p:boldItalic r:id="rId29"/>
+      <p:regular r:id="rId29"/>
+      <p:bold r:id="rId30"/>
+      <p:italic r:id="rId31"/>
+      <p:boldItalic r:id="rId32"/>
     </p:embeddedFont>
   </p:embeddedFontLst>
   <p:defaultTextStyle>
@@ -888,17 +891,53 @@
           </a:bodyPr>
           <a:lstStyle/>
           <a:p>
-            <a:pPr indent="0" lvl="0" marL="0" rtl="0" algn="l">
-              <a:spcBef>
-                <a:spcPts val="0"/>
-              </a:spcBef>
-              <a:spcAft>
-                <a:spcPts val="0"/>
-              </a:spcAft>
-              <a:buNone/>
-            </a:pPr>
-            <a:r>
-              <a:t/>
+            <a:pPr indent="-298450" lvl="0" marL="457200" rtl="0" algn="l">
+              <a:spcBef>
+                <a:spcPts val="0"/>
+              </a:spcBef>
+              <a:spcAft>
+                <a:spcPts val="0"/>
+              </a:spcAft>
+              <a:buSzPts val="1100"/>
+              <a:buAutoNum type="arabicPeriod"/>
+            </a:pPr>
+            <a:r>
+              <a:rPr lang="en"/>
+              <a:t>After we found the Beer_Permit_Locations dataset on Data.Nashville.gov, we downloaded it and uploaded it to our repository.</a:t>
+            </a:r>
+            <a:endParaRPr/>
+          </a:p>
+          <a:p>
+            <a:pPr indent="-298450" lvl="0" marL="457200" rtl="0" algn="l">
+              <a:spcBef>
+                <a:spcPts val="0"/>
+              </a:spcBef>
+              <a:spcAft>
+                <a:spcPts val="0"/>
+              </a:spcAft>
+              <a:buSzPts val="1100"/>
+              <a:buAutoNum type="arabicPeriod"/>
+            </a:pPr>
+            <a:r>
+              <a:rPr lang="en"/>
+              <a:t>After the initial download, the dataset had the following variables (point out the green rows in the screenshots)</a:t>
+            </a:r>
+            <a:endParaRPr/>
+          </a:p>
+          <a:p>
+            <a:pPr indent="-298450" lvl="0" marL="457200" rtl="0" algn="l">
+              <a:spcBef>
+                <a:spcPts val="0"/>
+              </a:spcBef>
+              <a:spcAft>
+                <a:spcPts val="0"/>
+              </a:spcAft>
+              <a:buSzPts val="1100"/>
+              <a:buAutoNum type="arabicPeriod"/>
+            </a:pPr>
+            <a:r>
+              <a:rPr lang="en"/>
+              <a:t>While many of the variables were indeed helpful for answering our questions - like Permit SubType and Date Issued - some of them needed to be transformed - like the Mapped Location variable - while other variables needed to be removed entirely.</a:t>
             </a:r>
             <a:endParaRPr/>
           </a:p>
@@ -987,17 +1026,224 @@
           </a:bodyPr>
           <a:lstStyle/>
           <a:p>
-            <a:pPr indent="0" lvl="0" marL="0" rtl="0" algn="l">
-              <a:spcBef>
-                <a:spcPts val="0"/>
-              </a:spcBef>
-              <a:spcAft>
-                <a:spcPts val="0"/>
-              </a:spcAft>
-              <a:buNone/>
-            </a:pPr>
-            <a:r>
-              <a:t/>
+            <a:pPr indent="-298450" lvl="0" marL="457200" rtl="0" algn="l">
+              <a:spcBef>
+                <a:spcPts val="0"/>
+              </a:spcBef>
+              <a:spcAft>
+                <a:spcPts val="0"/>
+              </a:spcAft>
+              <a:buSzPts val="1100"/>
+              <a:buAutoNum type="arabicPeriod"/>
+            </a:pPr>
+            <a:r>
+              <a:rPr lang="en"/>
+              <a:t>And so, the cleaning and </a:t>
+            </a:r>
+            <a:r>
+              <a:rPr lang="en"/>
+              <a:t>transformation</a:t>
+            </a:r>
+            <a:r>
+              <a:rPr lang="en"/>
+              <a:t> process began.</a:t>
+            </a:r>
+            <a:endParaRPr/>
+          </a:p>
+          <a:p>
+            <a:pPr indent="-298450" lvl="0" marL="457200" rtl="0" algn="l">
+              <a:spcBef>
+                <a:spcPts val="0"/>
+              </a:spcBef>
+              <a:spcAft>
+                <a:spcPts val="0"/>
+              </a:spcAft>
+              <a:buSzPts val="1100"/>
+              <a:buAutoNum type="arabicPeriod"/>
+            </a:pPr>
+            <a:r>
+              <a:rPr lang="en"/>
+              <a:t>In order to do this, we imported the dataset to jupyter </a:t>
+            </a:r>
+            <a:r>
+              <a:rPr lang="en"/>
+              <a:t>notebook</a:t>
+            </a:r>
+            <a:r>
+              <a:rPr lang="en"/>
+              <a:t> as a dataframe and imported pandas as a dependency.</a:t>
+            </a:r>
+            <a:endParaRPr/>
+          </a:p>
+          <a:p>
+            <a:pPr indent="-298450" lvl="0" marL="457200" rtl="0" algn="l">
+              <a:spcBef>
+                <a:spcPts val="0"/>
+              </a:spcBef>
+              <a:spcAft>
+                <a:spcPts val="0"/>
+              </a:spcAft>
+              <a:buSzPts val="1100"/>
+              <a:buAutoNum type="arabicPeriod"/>
+            </a:pPr>
+            <a:r>
+              <a:rPr lang="en"/>
+              <a:t>Then, we found and removed duplicates in the dataset using the code seen here </a:t>
+            </a:r>
+            <a:r>
+              <a:rPr b="1" lang="en"/>
+              <a:t>(point it out with pointer)</a:t>
+            </a:r>
+            <a:endParaRPr b="1"/>
+          </a:p>
+          <a:p>
+            <a:pPr indent="-298450" lvl="0" marL="457200" rtl="0" algn="l">
+              <a:spcBef>
+                <a:spcPts val="0"/>
+              </a:spcBef>
+              <a:spcAft>
+                <a:spcPts val="0"/>
+              </a:spcAft>
+              <a:buSzPts val="1100"/>
+              <a:buAutoNum type="arabicPeriod"/>
+            </a:pPr>
+            <a:r>
+              <a:rPr lang="en"/>
+              <a:t>Next, we removed rows with null values using the dropna() method</a:t>
+            </a:r>
+            <a:endParaRPr/>
+          </a:p>
+          <a:p>
+            <a:pPr indent="-298450" lvl="0" marL="457200" rtl="0" algn="l">
+              <a:spcBef>
+                <a:spcPts val="0"/>
+              </a:spcBef>
+              <a:spcAft>
+                <a:spcPts val="0"/>
+              </a:spcAft>
+              <a:buSzPts val="1100"/>
+              <a:buAutoNum type="arabicPeriod"/>
+            </a:pPr>
+            <a:r>
+              <a:rPr lang="en"/>
+              <a:t>After that, we removed all the columns that were not relevant to our question of interest</a:t>
+            </a:r>
+            <a:endParaRPr/>
+          </a:p>
+          <a:p>
+            <a:pPr indent="-298450" lvl="1" marL="914400" rtl="0" algn="l">
+              <a:spcBef>
+                <a:spcPts val="0"/>
+              </a:spcBef>
+              <a:spcAft>
+                <a:spcPts val="0"/>
+              </a:spcAft>
+              <a:buSzPts val="1100"/>
+              <a:buAutoNum type="alphaLcPeriod"/>
+            </a:pPr>
+            <a:r>
+              <a:rPr lang="en"/>
+              <a:t>To be clear, the screenshot shows the code we used to drop one of the unnecessary columns.</a:t>
+            </a:r>
+            <a:endParaRPr/>
+          </a:p>
+          <a:p>
+            <a:pPr indent="-298450" lvl="1" marL="914400" rtl="0" algn="l">
+              <a:spcBef>
+                <a:spcPts val="0"/>
+              </a:spcBef>
+              <a:spcAft>
+                <a:spcPts val="0"/>
+              </a:spcAft>
+              <a:buSzPts val="1100"/>
+              <a:buAutoNum type="alphaLcPeriod"/>
+            </a:pPr>
+            <a:r>
+              <a:rPr lang="en"/>
+              <a:t>All the unnecessary </a:t>
+            </a:r>
+            <a:r>
+              <a:rPr lang="en"/>
+              <a:t>columns</a:t>
+            </a:r>
+            <a:r>
+              <a:rPr lang="en"/>
+              <a:t> were removed using the methods shown in this screenshot.</a:t>
+            </a:r>
+            <a:endParaRPr/>
+          </a:p>
+          <a:p>
+            <a:pPr indent="-298450" lvl="0" marL="457200" rtl="0" algn="l">
+              <a:spcBef>
+                <a:spcPts val="0"/>
+              </a:spcBef>
+              <a:spcAft>
+                <a:spcPts val="0"/>
+              </a:spcAft>
+              <a:buSzPts val="1100"/>
+              <a:buAutoNum type="arabicPeriod"/>
+            </a:pPr>
+            <a:r>
+              <a:rPr lang="en"/>
+              <a:t>Moving on to transformation, the latitude and longitude values were extracted from the values in the Mapped Locations column using the lambda function in the screenshot, and the Mapped Locations column was subsequently deleted.</a:t>
+            </a:r>
+            <a:endParaRPr/>
+          </a:p>
+          <a:p>
+            <a:pPr indent="-298450" lvl="1" marL="914400" rtl="0" algn="l">
+              <a:spcBef>
+                <a:spcPts val="0"/>
+              </a:spcBef>
+              <a:spcAft>
+                <a:spcPts val="0"/>
+              </a:spcAft>
+              <a:buSzPts val="1100"/>
+              <a:buAutoNum type="alphaLcPeriod"/>
+            </a:pPr>
+            <a:r>
+              <a:rPr lang="en"/>
+              <a:t>This was done in order to create heat map visualizations for our dashboard and analysis.</a:t>
+            </a:r>
+            <a:endParaRPr/>
+          </a:p>
+          <a:p>
+            <a:pPr indent="-298450" lvl="0" marL="457200" rtl="0" algn="l">
+              <a:spcBef>
+                <a:spcPts val="0"/>
+              </a:spcBef>
+              <a:spcAft>
+                <a:spcPts val="0"/>
+              </a:spcAft>
+              <a:buSzPts val="1100"/>
+              <a:buAutoNum type="arabicPeriod"/>
+            </a:pPr>
+            <a:r>
+              <a:rPr lang="en"/>
+              <a:t>Then, permit </a:t>
+            </a:r>
+            <a:r>
+              <a:rPr lang="en"/>
+              <a:t>duration</a:t>
+            </a:r>
+            <a:r>
+              <a:rPr lang="en"/>
+              <a:t> values were </a:t>
+            </a:r>
+            <a:r>
+              <a:rPr lang="en"/>
+              <a:t>calculated</a:t>
+            </a:r>
+            <a:r>
+              <a:rPr lang="en"/>
+              <a:t> using the code shown here </a:t>
+            </a:r>
+            <a:r>
+              <a:rPr b="1" lang="en"/>
+              <a:t>(point to last screenshot with pointer)</a:t>
+            </a:r>
+            <a:r>
+              <a:rPr lang="en"/>
+              <a:t> and added to the dataset in the column permit_duration</a:t>
             </a:r>
             <a:endParaRPr/>
           </a:p>
@@ -1086,17 +1332,36 @@
           </a:bodyPr>
           <a:lstStyle/>
           <a:p>
-            <a:pPr indent="0" lvl="0" marL="0" rtl="0" algn="l">
-              <a:spcBef>
-                <a:spcPts val="0"/>
-              </a:spcBef>
-              <a:spcAft>
-                <a:spcPts val="0"/>
-              </a:spcAft>
-              <a:buNone/>
-            </a:pPr>
-            <a:r>
-              <a:t/>
+            <a:pPr indent="-298450" lvl="0" marL="457200" rtl="0" algn="l">
+              <a:spcBef>
+                <a:spcPts val="0"/>
+              </a:spcBef>
+              <a:spcAft>
+                <a:spcPts val="0"/>
+              </a:spcAft>
+              <a:buSzPts val="1100"/>
+              <a:buAutoNum type="arabicPeriod"/>
+            </a:pPr>
+            <a:r>
+              <a:rPr lang="en"/>
+              <a:t>Lastly, we exported the cleaned dataset as beer_permit_data_v1.csv, a snapshot of which can be seen here.</a:t>
+            </a:r>
+            <a:endParaRPr/>
+          </a:p>
+          <a:p>
+            <a:pPr indent="-298450" lvl="0" marL="457200" rtl="0" algn="l">
+              <a:spcBef>
+                <a:spcPts val="0"/>
+              </a:spcBef>
+              <a:spcAft>
+                <a:spcPts val="0"/>
+              </a:spcAft>
+              <a:buSzPts val="1100"/>
+              <a:buAutoNum type="arabicPeriod"/>
+            </a:pPr>
+            <a:r>
+              <a:rPr lang="en"/>
+              <a:t>As you can see, this cleaned dataset has much fewer columns than the original.</a:t>
             </a:r>
             <a:endParaRPr/>
           </a:p>
@@ -1185,17 +1450,121 @@
           </a:bodyPr>
           <a:lstStyle/>
           <a:p>
-            <a:pPr indent="0" lvl="0" marL="0" rtl="0" algn="l">
-              <a:spcBef>
-                <a:spcPts val="0"/>
-              </a:spcBef>
-              <a:spcAft>
-                <a:spcPts val="0"/>
-              </a:spcAft>
-              <a:buNone/>
-            </a:pPr>
-            <a:r>
-              <a:t/>
+            <a:pPr indent="-298450" lvl="0" marL="457200" rtl="0" algn="l">
+              <a:spcBef>
+                <a:spcPts val="0"/>
+              </a:spcBef>
+              <a:spcAft>
+                <a:spcPts val="0"/>
+              </a:spcAft>
+              <a:buSzPts val="1100"/>
+              <a:buAutoNum type="arabicPeriod"/>
+            </a:pPr>
+            <a:r>
+              <a:rPr lang="en"/>
+              <a:t>As for our database, we started off by creating an RDS instance and S3 bucket in AWS</a:t>
+            </a:r>
+            <a:endParaRPr/>
+          </a:p>
+          <a:p>
+            <a:pPr indent="-298450" lvl="1" marL="914400" rtl="0" algn="l">
+              <a:spcBef>
+                <a:spcPts val="0"/>
+              </a:spcBef>
+              <a:spcAft>
+                <a:spcPts val="0"/>
+              </a:spcAft>
+              <a:buSzPts val="1100"/>
+              <a:buAutoNum type="alphaLcPeriod"/>
+            </a:pPr>
+            <a:r>
+              <a:rPr lang="en"/>
+              <a:t>This was done to allow all members of our group to access data in our database</a:t>
+            </a:r>
+            <a:endParaRPr/>
+          </a:p>
+          <a:p>
+            <a:pPr indent="-298450" lvl="1" marL="914400" rtl="0" algn="l">
+              <a:spcBef>
+                <a:spcPts val="0"/>
+              </a:spcBef>
+              <a:spcAft>
+                <a:spcPts val="0"/>
+              </a:spcAft>
+              <a:buSzPts val="1100"/>
+              <a:buAutoNum type="alphaLcPeriod"/>
+            </a:pPr>
+            <a:r>
+              <a:rPr lang="en"/>
+              <a:t>Otherwise, only the member who made the database would have access to the data in the database</a:t>
+            </a:r>
+            <a:endParaRPr/>
+          </a:p>
+          <a:p>
+            <a:pPr indent="-298450" lvl="0" marL="457200" rtl="0" algn="l">
+              <a:spcBef>
+                <a:spcPts val="0"/>
+              </a:spcBef>
+              <a:spcAft>
+                <a:spcPts val="0"/>
+              </a:spcAft>
+              <a:buSzPts val="1100"/>
+              <a:buAutoNum type="arabicPeriod"/>
+            </a:pPr>
+            <a:r>
+              <a:rPr lang="en"/>
+              <a:t>Next, we connected pgadmin to the RDS instance and created tables to hold the data in the beer_permit_data_V1.csv data</a:t>
+            </a:r>
+            <a:endParaRPr/>
+          </a:p>
+          <a:p>
+            <a:pPr indent="-298450" lvl="0" marL="457200" rtl="0" algn="l">
+              <a:spcBef>
+                <a:spcPts val="0"/>
+              </a:spcBef>
+              <a:spcAft>
+                <a:spcPts val="0"/>
+              </a:spcAft>
+              <a:buSzPts val="1100"/>
+              <a:buAutoNum type="arabicPeriod"/>
+            </a:pPr>
+            <a:r>
+              <a:rPr lang="en"/>
+              <a:t>Finally, we utilized jupyter notebook to fill the pgadmin tables with the beer permit data</a:t>
+            </a:r>
+            <a:endParaRPr/>
+          </a:p>
+          <a:p>
+            <a:pPr indent="-298450" lvl="0" marL="457200" rtl="0" algn="l">
+              <a:spcBef>
+                <a:spcPts val="0"/>
+              </a:spcBef>
+              <a:spcAft>
+                <a:spcPts val="0"/>
+              </a:spcAft>
+              <a:buSzPts val="1100"/>
+              <a:buAutoNum type="arabicPeriod"/>
+            </a:pPr>
+            <a:r>
+              <a:rPr lang="en"/>
+              <a:t>The last thing we did in this initial setup phase is create starter code for our unsupervised machine learning model.</a:t>
+            </a:r>
+            <a:endParaRPr/>
+          </a:p>
+          <a:p>
+            <a:pPr indent="-298450" lvl="1" marL="914400" rtl="0" algn="l">
+              <a:spcBef>
+                <a:spcPts val="0"/>
+              </a:spcBef>
+              <a:spcAft>
+                <a:spcPts val="0"/>
+              </a:spcAft>
+              <a:buSzPts val="1100"/>
+              <a:buAutoNum type="alphaLcPeriod"/>
+            </a:pPr>
+            <a:r>
+              <a:rPr lang="en"/>
+              <a:t>At this point in our project, the code basically took data from our database and outputted labels</a:t>
             </a:r>
             <a:endParaRPr/>
           </a:p>
@@ -1384,8 +1753,192 @@
           <a:lstStyle/>
           <a:p>
             <a:pPr indent="0" lvl="0" marL="0" rtl="0" algn="l">
-              <a:spcBef>
-                <a:spcPts val="0"/>
+              <a:lnSpc>
+                <a:spcPct val="115000"/>
+              </a:lnSpc>
+              <a:spcBef>
+                <a:spcPts val="0"/>
+              </a:spcBef>
+              <a:spcAft>
+                <a:spcPts val="0"/>
+              </a:spcAft>
+              <a:buNone/>
+            </a:pPr>
+            <a:r>
+              <a:rPr lang="en" sz="1200">
+                <a:solidFill>
+                  <a:srgbClr val="24292F"/>
+                </a:solidFill>
+                <a:highlight>
+                  <a:srgbClr val="FFFFFF"/>
+                </a:highlight>
+              </a:rPr>
+              <a:t>After the initial test data set taken from the beer permit data from data.nashville.gov, additional cleaning was required to remove empty rows and values.  This reduced the dataset to the final size of 1306 rows indexed on </a:t>
+            </a:r>
+            <a:r>
+              <a:rPr lang="en" sz="1200">
+                <a:solidFill>
+                  <a:srgbClr val="24292F"/>
+                </a:solidFill>
+                <a:highlight>
+                  <a:srgbClr val="FFFFFF"/>
+                </a:highlight>
+              </a:rPr>
+              <a:t>unique permit number values.  Added an API feature to pull updated permit data from data.nashville.gov.</a:t>
+            </a:r>
+            <a:endParaRPr sz="1200">
+              <a:solidFill>
+                <a:srgbClr val="24292F"/>
+              </a:solidFill>
+              <a:highlight>
+                <a:srgbClr val="FFFFFF"/>
+              </a:highlight>
+            </a:endParaRPr>
+          </a:p>
+          <a:p>
+            <a:pPr indent="0" lvl="0" marL="0" rtl="0" algn="l">
+              <a:lnSpc>
+                <a:spcPct val="115000"/>
+              </a:lnSpc>
+              <a:spcBef>
+                <a:spcPts val="1200"/>
+              </a:spcBef>
+              <a:spcAft>
+                <a:spcPts val="0"/>
+              </a:spcAft>
+              <a:buNone/>
+            </a:pPr>
+            <a:r>
+              <a:rPr lang="en" sz="1200">
+                <a:solidFill>
+                  <a:srgbClr val="24292F"/>
+                </a:solidFill>
+                <a:highlight>
+                  <a:srgbClr val="FFFFFF"/>
+                </a:highlight>
+              </a:rPr>
+              <a:t>Census data includes population, average income by zip code, and education levels.  Total population has sub groups of male and female, and divisions of total 18+, and 10 your groups starting with 18-24 y/o.  Education is grouped by not high school, high school, and bachelors or higher for each 10 year age range.  The data is indexed on unique </a:t>
+            </a:r>
+            <a:r>
+              <a:rPr lang="en" sz="1200">
+                <a:solidFill>
+                  <a:srgbClr val="24292F"/>
+                </a:solidFill>
+                <a:highlight>
+                  <a:srgbClr val="FFFFFF"/>
+                </a:highlight>
+              </a:rPr>
+              <a:t>zip code values.  </a:t>
+            </a:r>
+            <a:endParaRPr sz="1200">
+              <a:solidFill>
+                <a:srgbClr val="24292F"/>
+              </a:solidFill>
+              <a:highlight>
+                <a:srgbClr val="FFFFFF"/>
+              </a:highlight>
+            </a:endParaRPr>
+          </a:p>
+          <a:p>
+            <a:pPr indent="0" lvl="0" marL="0" rtl="0" algn="l">
+              <a:lnSpc>
+                <a:spcPct val="115000"/>
+              </a:lnSpc>
+              <a:spcBef>
+                <a:spcPts val="1200"/>
+              </a:spcBef>
+              <a:spcAft>
+                <a:spcPts val="0"/>
+              </a:spcAft>
+              <a:buNone/>
+            </a:pPr>
+            <a:r>
+              <a:rPr lang="en" sz="1200">
+                <a:solidFill>
+                  <a:srgbClr val="24292F"/>
+                </a:solidFill>
+                <a:highlight>
+                  <a:srgbClr val="FFFFFF"/>
+                </a:highlight>
+              </a:rPr>
+              <a:t>The datasets were set up in PostgresSQL with a foreign key relationship on zip code in PGAdmin and joined on zip code.  The joined dataset was added to an S3 bucket in AWS.  The schema is available in the repo. </a:t>
+            </a:r>
+            <a:endParaRPr>
+              <a:solidFill>
+                <a:srgbClr val="24292F"/>
+              </a:solidFill>
+              <a:highlight>
+                <a:srgbClr val="FFFFFF"/>
+              </a:highlight>
+            </a:endParaRPr>
+          </a:p>
+          <a:p>
+            <a:pPr indent="0" lvl="0" marL="0" rtl="0" algn="l">
+              <a:lnSpc>
+                <a:spcPct val="115000"/>
+              </a:lnSpc>
+              <a:spcBef>
+                <a:spcPts val="1200"/>
+              </a:spcBef>
+              <a:spcAft>
+                <a:spcPts val="0"/>
+              </a:spcAft>
+              <a:buNone/>
+            </a:pPr>
+            <a:r>
+              <a:rPr lang="en" sz="1200">
+                <a:solidFill>
+                  <a:srgbClr val="24292F"/>
+                </a:solidFill>
+                <a:highlight>
+                  <a:srgbClr val="FFFFFF"/>
+                </a:highlight>
+              </a:rPr>
+              <a:t>Pyspark to pull data from S3 buckets. </a:t>
+            </a:r>
+            <a:endParaRPr sz="1200">
+              <a:solidFill>
+                <a:srgbClr val="24292F"/>
+              </a:solidFill>
+              <a:highlight>
+                <a:srgbClr val="FFFFFF"/>
+              </a:highlight>
+            </a:endParaRPr>
+          </a:p>
+          <a:p>
+            <a:pPr indent="0" lvl="0" marL="0" rtl="0" algn="l">
+              <a:lnSpc>
+                <a:spcPct val="115000"/>
+              </a:lnSpc>
+              <a:spcBef>
+                <a:spcPts val="1200"/>
+              </a:spcBef>
+              <a:spcAft>
+                <a:spcPts val="0"/>
+              </a:spcAft>
+              <a:buClr>
+                <a:schemeClr val="dk1"/>
+              </a:buClr>
+              <a:buSzPts val="1100"/>
+              <a:buFont typeface="Arial"/>
+              <a:buNone/>
+            </a:pPr>
+            <a:r>
+              <a:t/>
+            </a:r>
+            <a:endParaRPr sz="1200">
+              <a:solidFill>
+                <a:srgbClr val="C9D1D9"/>
+              </a:solidFill>
+              <a:highlight>
+                <a:srgbClr val="0D1117"/>
+              </a:highlight>
+            </a:endParaRPr>
+          </a:p>
+          <a:p>
+            <a:pPr indent="0" lvl="0" marL="0" rtl="0" algn="l">
+              <a:spcBef>
+                <a:spcPts val="1200"/>
               </a:spcBef>
               <a:spcAft>
                 <a:spcPts val="0"/>
@@ -1483,8 +2036,153 @@
           <a:lstStyle/>
           <a:p>
             <a:pPr indent="0" lvl="0" marL="0" rtl="0" algn="l">
-              <a:spcBef>
-                <a:spcPts val="0"/>
+              <a:lnSpc>
+                <a:spcPct val="115000"/>
+              </a:lnSpc>
+              <a:spcBef>
+                <a:spcPts val="0"/>
+              </a:spcBef>
+              <a:spcAft>
+                <a:spcPts val="0"/>
+              </a:spcAft>
+              <a:buClr>
+                <a:schemeClr val="dk1"/>
+              </a:buClr>
+              <a:buSzPts val="1100"/>
+              <a:buFont typeface="Arial"/>
+              <a:buNone/>
+            </a:pPr>
+            <a:r>
+              <a:rPr lang="en" sz="1200">
+                <a:solidFill>
+                  <a:srgbClr val="24292F"/>
+                </a:solidFill>
+                <a:highlight>
+                  <a:srgbClr val="FFFFFF"/>
+                </a:highlight>
+              </a:rPr>
+              <a:t>Pyspark was </a:t>
+            </a:r>
+            <a:r>
+              <a:rPr lang="en" sz="1200">
+                <a:solidFill>
+                  <a:srgbClr val="24292F"/>
+                </a:solidFill>
+                <a:highlight>
+                  <a:srgbClr val="FFFFFF"/>
+                </a:highlight>
+              </a:rPr>
+              <a:t>utilized</a:t>
+            </a:r>
+            <a:r>
+              <a:rPr lang="en" sz="1200">
+                <a:solidFill>
+                  <a:srgbClr val="24292F"/>
+                </a:solidFill>
+                <a:highlight>
+                  <a:srgbClr val="FFFFFF"/>
+                </a:highlight>
+              </a:rPr>
+              <a:t> in google colab to pull data from the database.  We initially believed an unsupervised clustering model would present the information necessary to make predictions to answer our main question.  Utilizing principal component analysis(PCA) to standardize the features </a:t>
+            </a:r>
+            <a:r>
+              <a:rPr lang="en" sz="1200">
+                <a:solidFill>
+                  <a:srgbClr val="24292F"/>
+                </a:solidFill>
+                <a:highlight>
+                  <a:schemeClr val="lt1"/>
+                </a:highlight>
+              </a:rPr>
+              <a:t>(21 features including population age groups, education, income)</a:t>
+            </a:r>
+            <a:r>
+              <a:rPr lang="en" sz="1200">
+                <a:solidFill>
+                  <a:srgbClr val="24292F"/>
+                </a:solidFill>
+                <a:highlight>
+                  <a:srgbClr val="FFFFFF"/>
+                </a:highlight>
+              </a:rPr>
+              <a:t> and get “dummies” to categorize zip code and permit numbers as binary features.  The model adequately clustered the data. The visualized grouping of data, as seen here, does not sufficiently identify those features that contribute to the correlation.  It does indicate a good correlation between </a:t>
+            </a:r>
+            <a:r>
+              <a:rPr lang="en" sz="1200">
+                <a:solidFill>
+                  <a:srgbClr val="24292F"/>
+                </a:solidFill>
+                <a:highlight>
+                  <a:schemeClr val="lt1"/>
+                </a:highlight>
+              </a:rPr>
+              <a:t>features</a:t>
+            </a:r>
+            <a:r>
+              <a:rPr lang="en" sz="1200">
+                <a:solidFill>
+                  <a:srgbClr val="24292F"/>
+                </a:solidFill>
+                <a:highlight>
+                  <a:srgbClr val="FFFFFF"/>
+                </a:highlight>
+              </a:rPr>
+              <a:t>, and further analysis would be required.  </a:t>
+            </a:r>
+            <a:r>
+              <a:rPr lang="en" sz="1200">
+                <a:solidFill>
+                  <a:srgbClr val="24292F"/>
+                </a:solidFill>
+                <a:highlight>
+                  <a:schemeClr val="lt1"/>
+                </a:highlight>
+              </a:rPr>
+              <a:t>Our goal was to identify the orange X and yellow Diamond from the visualization above.   </a:t>
+            </a:r>
+            <a:endParaRPr sz="1200">
+              <a:solidFill>
+                <a:srgbClr val="24292F"/>
+              </a:solidFill>
+              <a:highlight>
+                <a:schemeClr val="lt1"/>
+              </a:highlight>
+            </a:endParaRPr>
+          </a:p>
+          <a:p>
+            <a:pPr indent="0" lvl="0" marL="0" rtl="0" algn="l">
+              <a:lnSpc>
+                <a:spcPct val="115000"/>
+              </a:lnSpc>
+              <a:spcBef>
+                <a:spcPts val="1200"/>
+              </a:spcBef>
+              <a:spcAft>
+                <a:spcPts val="0"/>
+              </a:spcAft>
+              <a:buClr>
+                <a:schemeClr val="dk1"/>
+              </a:buClr>
+              <a:buSzPts val="1100"/>
+              <a:buFont typeface="Arial"/>
+              <a:buNone/>
+            </a:pPr>
+            <a:r>
+              <a:t/>
+            </a:r>
+            <a:endParaRPr sz="1200">
+              <a:solidFill>
+                <a:srgbClr val="24292F"/>
+              </a:solidFill>
+              <a:highlight>
+                <a:srgbClr val="FFFFFF"/>
+              </a:highlight>
+            </a:endParaRPr>
+          </a:p>
+          <a:p>
+            <a:pPr indent="0" lvl="0" marL="0" rtl="0" algn="l">
+              <a:spcBef>
+                <a:spcPts val="1200"/>
               </a:spcBef>
               <a:spcAft>
                 <a:spcPts val="0"/>
@@ -1582,8 +2280,190 @@
           <a:lstStyle/>
           <a:p>
             <a:pPr indent="0" lvl="0" marL="0" rtl="0" algn="l">
-              <a:spcBef>
-                <a:spcPts val="0"/>
+              <a:lnSpc>
+                <a:spcPct val="125000"/>
+              </a:lnSpc>
+              <a:spcBef>
+                <a:spcPts val="1800"/>
+              </a:spcBef>
+              <a:spcAft>
+                <a:spcPts val="0"/>
+              </a:spcAft>
+              <a:buClr>
+                <a:schemeClr val="dk1"/>
+              </a:buClr>
+              <a:buSzPts val="1100"/>
+              <a:buFont typeface="Arial"/>
+              <a:buNone/>
+            </a:pPr>
+            <a:r>
+              <a:rPr lang="en">
+                <a:solidFill>
+                  <a:srgbClr val="24292F"/>
+                </a:solidFill>
+              </a:rPr>
+              <a:t>Changed model to supervised- clustering model.  Used PCA to combine and standardize features into a Random Forest model.  </a:t>
+            </a:r>
+            <a:endParaRPr>
+              <a:solidFill>
+                <a:srgbClr val="24292F"/>
+              </a:solidFill>
+            </a:endParaRPr>
+          </a:p>
+          <a:p>
+            <a:pPr indent="0" lvl="0" marL="0" rtl="0" algn="l">
+              <a:lnSpc>
+                <a:spcPct val="125000"/>
+              </a:lnSpc>
+              <a:spcBef>
+                <a:spcPts val="1800"/>
+              </a:spcBef>
+              <a:spcAft>
+                <a:spcPts val="0"/>
+              </a:spcAft>
+              <a:buClr>
+                <a:schemeClr val="dk1"/>
+              </a:buClr>
+              <a:buSzPts val="1100"/>
+              <a:buFont typeface="Arial"/>
+              <a:buNone/>
+            </a:pPr>
+            <a:r>
+              <a:rPr lang="en">
+                <a:solidFill>
+                  <a:srgbClr val="24292F"/>
+                </a:solidFill>
+              </a:rPr>
+              <a:t>Supervised learning was selected for this task. Random Forest was </a:t>
+            </a:r>
+            <a:r>
+              <a:rPr lang="en">
+                <a:solidFill>
+                  <a:srgbClr val="24292F"/>
+                </a:solidFill>
+              </a:rPr>
+              <a:t>selected</a:t>
+            </a:r>
+            <a:r>
+              <a:rPr lang="en">
+                <a:solidFill>
+                  <a:srgbClr val="24292F"/>
+                </a:solidFill>
+              </a:rPr>
+              <a:t> for its ability to handle multiple features and large datasets by randomly sampling each feature. These models resist overfitting and can rank the importance of input variables.  </a:t>
+            </a:r>
+            <a:endParaRPr>
+              <a:solidFill>
+                <a:srgbClr val="24292F"/>
+              </a:solidFill>
+            </a:endParaRPr>
+          </a:p>
+          <a:p>
+            <a:pPr indent="0" lvl="0" marL="0" rtl="0" algn="l">
+              <a:lnSpc>
+                <a:spcPct val="125000"/>
+              </a:lnSpc>
+              <a:spcBef>
+                <a:spcPts val="1800"/>
+              </a:spcBef>
+              <a:spcAft>
+                <a:spcPts val="0"/>
+              </a:spcAft>
+              <a:buClr>
+                <a:schemeClr val="dk1"/>
+              </a:buClr>
+              <a:buSzPts val="1100"/>
+              <a:buFont typeface="Arial"/>
+              <a:buNone/>
+            </a:pPr>
+            <a:r>
+              <a:rPr lang="en">
+                <a:solidFill>
+                  <a:srgbClr val="24292F"/>
+                </a:solidFill>
+              </a:rPr>
+              <a:t>Feature engineering:  the data lacked a “success” feature.  Finance data or not-renewed beer permit data was not available.  We created binary classifier for success based on more than 2 years permit duration.  </a:t>
+            </a:r>
+            <a:endParaRPr>
+              <a:solidFill>
+                <a:srgbClr val="24292F"/>
+              </a:solidFill>
+            </a:endParaRPr>
+          </a:p>
+          <a:p>
+            <a:pPr indent="0" lvl="0" marL="0" rtl="0" algn="l">
+              <a:lnSpc>
+                <a:spcPct val="125000"/>
+              </a:lnSpc>
+              <a:spcBef>
+                <a:spcPts val="1800"/>
+              </a:spcBef>
+              <a:spcAft>
+                <a:spcPts val="0"/>
+              </a:spcAft>
+              <a:buClr>
+                <a:schemeClr val="dk1"/>
+              </a:buClr>
+              <a:buSzPts val="1100"/>
+              <a:buFont typeface="Arial"/>
+              <a:buNone/>
+            </a:pPr>
+            <a:r>
+              <a:rPr lang="en">
+                <a:solidFill>
+                  <a:srgbClr val="24292F"/>
+                </a:solidFill>
+              </a:rPr>
+              <a:t>Features for this model were slowly limited by the ranking of features through trial and error within the model.  </a:t>
+            </a:r>
+            <a:endParaRPr>
+              <a:solidFill>
+                <a:srgbClr val="24292F"/>
+              </a:solidFill>
+            </a:endParaRPr>
+          </a:p>
+          <a:p>
+            <a:pPr indent="0" lvl="0" marL="0" rtl="0" algn="l">
+              <a:lnSpc>
+                <a:spcPct val="115000"/>
+              </a:lnSpc>
+              <a:spcBef>
+                <a:spcPts val="1200"/>
+              </a:spcBef>
+              <a:spcAft>
+                <a:spcPts val="0"/>
+              </a:spcAft>
+              <a:buClr>
+                <a:schemeClr val="dk1"/>
+              </a:buClr>
+              <a:buSzPts val="1100"/>
+              <a:buFont typeface="Arial"/>
+              <a:buNone/>
+            </a:pPr>
+            <a:r>
+              <a:rPr lang="en" sz="1200">
+                <a:solidFill>
+                  <a:srgbClr val="24292F"/>
+                </a:solidFill>
+                <a:highlight>
+                  <a:srgbClr val="FFFFFF"/>
+                </a:highlight>
+              </a:rPr>
+              <a:t>The current accuracy of the model is 74%. Further tuning may be needed to improve this number, if possible. However, trial and error in feature selection has been performed to achieve the current result. For the purposes of business success probability, this model is sufficiently accurate. </a:t>
+            </a:r>
+            <a:endParaRPr sz="1200">
+              <a:solidFill>
+                <a:srgbClr val="24292F"/>
+              </a:solidFill>
+              <a:highlight>
+                <a:srgbClr val="FFFFFF"/>
+              </a:highlight>
+            </a:endParaRPr>
+          </a:p>
+          <a:p>
+            <a:pPr indent="0" lvl="0" marL="0" rtl="0" algn="l">
+              <a:spcBef>
+                <a:spcPts val="1200"/>
               </a:spcBef>
               <a:spcAft>
                 <a:spcPts val="0"/>
@@ -1690,7 +2570,32 @@
               <a:buNone/>
             </a:pPr>
             <a:r>
-              <a:t/>
+              <a:rPr lang="en"/>
+              <a:t>Using the data output from the Data Exploration Process, we used </a:t>
+            </a:r>
+            <a:r>
+              <a:rPr lang="en"/>
+              <a:t>Tableau</a:t>
+            </a:r>
+            <a:r>
+              <a:rPr lang="en"/>
+              <a:t> to create multiple interactive </a:t>
+            </a:r>
+            <a:r>
+              <a:rPr lang="en"/>
+              <a:t>visualizations</a:t>
+            </a:r>
+            <a:r>
+              <a:rPr lang="en"/>
+              <a:t> to display our data analysis results. </a:t>
+            </a:r>
+            <a:r>
+              <a:rPr lang="en"/>
+              <a:t>Included</a:t>
+            </a:r>
+            <a:r>
+              <a:rPr lang="en"/>
+              <a:t> in each of the visualizations are filters that can be used in order to display specific data. The data displayed can be narrowed down by zip code, type of permit, and age group. (SHOW DASHBOARD)</a:t>
             </a:r>
             <a:endParaRPr/>
           </a:p>
@@ -1723,7 +2628,7 @@
       </p:grpSpPr>
       <p:sp>
         <p:nvSpPr>
-          <p:cNvPr id="253" name="Google Shape;253;ge7eb311e9c_0_21:notes"/>
+          <p:cNvPr id="253" name="Google Shape;253;ge8144aac58_0_0:notes"/>
           <p:cNvSpPr/>
           <p:nvPr>
             <p:ph idx="2" type="sldImg"/>
@@ -1758,7 +2663,7 @@
       </p:sp>
       <p:sp>
         <p:nvSpPr>
-          <p:cNvPr id="254" name="Google Shape;254;ge7eb311e9c_0_21:notes"/>
+          <p:cNvPr id="254" name="Google Shape;254;ge8144aac58_0_0:notes"/>
           <p:cNvSpPr txBox="1"/>
           <p:nvPr>
             <p:ph idx="1" type="body"/>
@@ -1789,7 +2694,47 @@
               <a:buNone/>
             </a:pPr>
             <a:r>
+              <a:rPr lang="en"/>
+              <a:t>With the visualization, we were able to determine that the further a beer selling </a:t>
+            </a:r>
+            <a:r>
+              <a:rPr lang="en"/>
+              <a:t>establishment</a:t>
+            </a:r>
+            <a:r>
+              <a:rPr lang="en"/>
+              <a:t> is from Downtown Nashville, the longer the beer permit has been active. </a:t>
+            </a:r>
+            <a:endParaRPr/>
+          </a:p>
+          <a:p>
+            <a:pPr indent="0" lvl="0" marL="0" rtl="0" algn="l">
+              <a:spcBef>
+                <a:spcPts val="0"/>
+              </a:spcBef>
+              <a:spcAft>
+                <a:spcPts val="0"/>
+              </a:spcAft>
+              <a:buNone/>
+            </a:pPr>
+            <a:r>
               <a:t/>
+            </a:r>
+            <a:endParaRPr/>
+          </a:p>
+          <a:p>
+            <a:pPr indent="0" lvl="0" marL="0" rtl="0" algn="l">
+              <a:spcBef>
+                <a:spcPts val="0"/>
+              </a:spcBef>
+              <a:spcAft>
+                <a:spcPts val="0"/>
+              </a:spcAft>
+              <a:buNone/>
+            </a:pPr>
+            <a:r>
+              <a:rPr lang="en"/>
+              <a:t>Another interesting finding, is that the higher the income level within a given zip code, the fewer the beer serving establishments there are. </a:t>
             </a:r>
             <a:endParaRPr/>
           </a:p>
@@ -1888,7 +2833,8 @@
               <a:buNone/>
             </a:pPr>
             <a:r>
-              <a:t/>
+              <a:rPr lang="en"/>
+              <a:t>Project Overview</a:t>
             </a:r>
             <a:endParaRPr/>
           </a:p>
@@ -1921,7 +2867,7 @@
       </p:grpSpPr>
       <p:sp>
         <p:nvSpPr>
-          <p:cNvPr id="260" name="Google Shape;260;ge552042212_0_334:notes"/>
+          <p:cNvPr id="260" name="Google Shape;260;ge8144aac58_0_15:notes"/>
           <p:cNvSpPr/>
           <p:nvPr>
             <p:ph idx="2" type="sldImg"/>
@@ -1956,7 +2902,471 @@
       </p:sp>
       <p:sp>
         <p:nvSpPr>
-          <p:cNvPr id="261" name="Google Shape;261;ge552042212_0_334:notes"/>
+          <p:cNvPr id="261" name="Google Shape;261;ge8144aac58_0_15:notes"/>
+          <p:cNvSpPr txBox="1"/>
+          <p:nvPr>
+            <p:ph idx="1" type="body"/>
+          </p:nvPr>
+        </p:nvSpPr>
+        <p:spPr>
+          <a:xfrm>
+            <a:off x="685800" y="4343400"/>
+            <a:ext cx="5486400" cy="4114800"/>
+          </a:xfrm>
+          <a:prstGeom prst="rect">
+            <a:avLst/>
+          </a:prstGeom>
+        </p:spPr>
+        <p:txBody>
+          <a:bodyPr anchorCtr="0" anchor="t" bIns="91425" lIns="91425" spcFirstLastPara="1" rIns="91425" wrap="square" tIns="91425">
+            <a:noAutofit/>
+          </a:bodyPr>
+          <a:lstStyle/>
+          <a:p>
+            <a:pPr indent="0" lvl="0" marL="0" rtl="0" algn="l">
+              <a:spcBef>
+                <a:spcPts val="0"/>
+              </a:spcBef>
+              <a:spcAft>
+                <a:spcPts val="0"/>
+              </a:spcAft>
+              <a:buNone/>
+            </a:pPr>
+            <a:r>
+              <a:rPr lang="en"/>
+              <a:t>When looking at the measure of “</a:t>
+            </a:r>
+            <a:r>
+              <a:rPr lang="en"/>
+              <a:t>success</a:t>
+            </a:r>
+            <a:r>
+              <a:rPr lang="en"/>
+              <a:t>”, there are many different ways to measure that. In our </a:t>
+            </a:r>
+            <a:r>
+              <a:rPr lang="en"/>
+              <a:t>analysis</a:t>
+            </a:r>
+            <a:r>
+              <a:rPr lang="en"/>
+              <a:t>, we used </a:t>
+            </a:r>
+            <a:r>
+              <a:rPr lang="en"/>
+              <a:t>active</a:t>
+            </a:r>
+            <a:r>
+              <a:rPr lang="en"/>
+              <a:t> permit duration (by days) to measure success. For future analysis, we could recommended using </a:t>
+            </a:r>
+            <a:r>
+              <a:rPr lang="en"/>
+              <a:t>multiple</a:t>
+            </a:r>
+            <a:r>
+              <a:rPr lang="en"/>
+              <a:t> different measures of success. On top of active permit duration, using other datasets such as review data (Yelp or Google) and Revenue data.</a:t>
+            </a:r>
+            <a:endParaRPr/>
+          </a:p>
+        </p:txBody>
+      </p:sp>
+    </p:spTree>
+  </p:cSld>
+  <p:clrMapOvr>
+    <a:masterClrMapping/>
+  </p:clrMapOvr>
+</p:notes>
+</file>
+
+<file path=ppt/notesSlides/notesSlide21.xml><?xml version="1.0" encoding="utf-8"?>
+<p:notes xmlns:a="http://schemas.openxmlformats.org/drawingml/2006/main" xmlns:r="http://schemas.openxmlformats.org/officeDocument/2006/relationships" xmlns:mc="http://schemas.openxmlformats.org/markup-compatibility/2006" xmlns:mv="urn:schemas-microsoft-com:mac:vml" xmlns:p="http://schemas.openxmlformats.org/presentationml/2006/main" xmlns:c="http://schemas.openxmlformats.org/drawingml/2006/chart" xmlns:dgm="http://schemas.openxmlformats.org/drawingml/2006/diagram" xmlns:o="urn:schemas-microsoft-com:office:office" xmlns:v="urn:schemas-microsoft-com:vml" xmlns:pvml="urn:schemas-microsoft-com:office:powerpoint" xmlns:com="http://schemas.openxmlformats.org/drawingml/2006/compatibility" xmlns:p14="http://schemas.microsoft.com/office/powerpoint/2010/main" xmlns:p15="http://schemas.microsoft.com/office/powerpoint/2012/main" xmlns:ahyp="http://schemas.microsoft.com/office/drawing/2018/hyperlinkcolor" showMasterPhAnim="0" showMasterSp="0">
+  <p:cSld>
+    <p:spTree>
+      <p:nvGrpSpPr>
+        <p:cNvPr id="266" name="Shape 266"/>
+        <p:cNvGrpSpPr/>
+        <p:nvPr/>
+      </p:nvGrpSpPr>
+      <p:grpSpPr>
+        <a:xfrm>
+          <a:off x="0" y="0"/>
+          <a:ext cx="0" cy="0"/>
+          <a:chOff x="0" y="0"/>
+          <a:chExt cx="0" cy="0"/>
+        </a:xfrm>
+      </p:grpSpPr>
+      <p:sp>
+        <p:nvSpPr>
+          <p:cNvPr id="267" name="Google Shape;267;ge8144aac58_0_25:notes"/>
+          <p:cNvSpPr/>
+          <p:nvPr>
+            <p:ph idx="2" type="sldImg"/>
+          </p:nvPr>
+        </p:nvSpPr>
+        <p:spPr>
+          <a:xfrm>
+            <a:off x="381300" y="685800"/>
+            <a:ext cx="6096000" cy="3429000"/>
+          </a:xfrm>
+          <a:custGeom>
+            <a:rect b="b" l="l" r="r" t="t"/>
+            <a:pathLst>
+              <a:path extrusionOk="0" h="120000" w="120000">
+                <a:moveTo>
+                  <a:pt x="0" y="0"/>
+                </a:moveTo>
+                <a:lnTo>
+                  <a:pt x="120000" y="0"/>
+                </a:lnTo>
+                <a:lnTo>
+                  <a:pt x="120000" y="120000"/>
+                </a:lnTo>
+                <a:lnTo>
+                  <a:pt x="0" y="120000"/>
+                </a:lnTo>
+                <a:close/>
+              </a:path>
+            </a:pathLst>
+          </a:custGeom>
+        </p:spPr>
+      </p:sp>
+      <p:sp>
+        <p:nvSpPr>
+          <p:cNvPr id="268" name="Google Shape;268;ge8144aac58_0_25:notes"/>
+          <p:cNvSpPr txBox="1"/>
+          <p:nvPr>
+            <p:ph idx="1" type="body"/>
+          </p:nvPr>
+        </p:nvSpPr>
+        <p:spPr>
+          <a:xfrm>
+            <a:off x="685800" y="4343400"/>
+            <a:ext cx="5486400" cy="4114800"/>
+          </a:xfrm>
+          <a:prstGeom prst="rect">
+            <a:avLst/>
+          </a:prstGeom>
+        </p:spPr>
+        <p:txBody>
+          <a:bodyPr anchorCtr="0" anchor="t" bIns="91425" lIns="91425" spcFirstLastPara="1" rIns="91425" wrap="square" tIns="91425">
+            <a:noAutofit/>
+          </a:bodyPr>
+          <a:lstStyle/>
+          <a:p>
+            <a:pPr indent="0" lvl="0" marL="0" rtl="0" algn="l">
+              <a:spcBef>
+                <a:spcPts val="0"/>
+              </a:spcBef>
+              <a:spcAft>
+                <a:spcPts val="0"/>
+              </a:spcAft>
+              <a:buNone/>
+            </a:pPr>
+            <a:r>
+              <a:rPr lang="en"/>
+              <a:t>When looking back at our project, there are a few things that we would have done differently. </a:t>
+            </a:r>
+            <a:endParaRPr/>
+          </a:p>
+          <a:p>
+            <a:pPr indent="0" lvl="0" marL="0" rtl="0" algn="l">
+              <a:spcBef>
+                <a:spcPts val="0"/>
+              </a:spcBef>
+              <a:spcAft>
+                <a:spcPts val="0"/>
+              </a:spcAft>
+              <a:buNone/>
+            </a:pPr>
+            <a:r>
+              <a:t/>
+            </a:r>
+            <a:endParaRPr/>
+          </a:p>
+          <a:p>
+            <a:pPr indent="0" lvl="0" marL="0" rtl="0" algn="l">
+              <a:spcBef>
+                <a:spcPts val="0"/>
+              </a:spcBef>
+              <a:spcAft>
+                <a:spcPts val="0"/>
+              </a:spcAft>
+              <a:buNone/>
+            </a:pPr>
+            <a:r>
+              <a:rPr lang="en"/>
+              <a:t>First, finding and adding rent data by zip code. </a:t>
+            </a:r>
+            <a:endParaRPr/>
+          </a:p>
+          <a:p>
+            <a:pPr indent="0" lvl="0" marL="0" rtl="0" algn="l">
+              <a:spcBef>
+                <a:spcPts val="0"/>
+              </a:spcBef>
+              <a:spcAft>
+                <a:spcPts val="0"/>
+              </a:spcAft>
+              <a:buNone/>
+            </a:pPr>
+            <a:r>
+              <a:t/>
+            </a:r>
+            <a:endParaRPr/>
+          </a:p>
+          <a:p>
+            <a:pPr indent="0" lvl="0" marL="0" rtl="0" algn="l">
+              <a:spcBef>
+                <a:spcPts val="0"/>
+              </a:spcBef>
+              <a:spcAft>
+                <a:spcPts val="0"/>
+              </a:spcAft>
+              <a:buNone/>
+            </a:pPr>
+            <a:r>
+              <a:rPr lang="en"/>
+              <a:t>Another would be </a:t>
+            </a:r>
+            <a:r>
+              <a:rPr lang="en"/>
+              <a:t>alongside</a:t>
+            </a:r>
+            <a:r>
+              <a:rPr lang="en"/>
+              <a:t> our current data using hotel and short term rental datasets and mapping them. </a:t>
+            </a:r>
+            <a:r>
+              <a:rPr lang="en"/>
+              <a:t>According</a:t>
+            </a:r>
+            <a:r>
+              <a:rPr lang="en"/>
+              <a:t> to visitmusiccity.com, in 2019 there were 16.1 million </a:t>
+            </a:r>
+            <a:r>
+              <a:rPr lang="en"/>
+              <a:t>visitors</a:t>
+            </a:r>
+            <a:r>
+              <a:rPr lang="en"/>
+              <a:t> to Nashville. If an establishment were looking for a new location to open and be successful, having this data available could be impactful. </a:t>
+            </a:r>
+            <a:endParaRPr/>
+          </a:p>
+          <a:p>
+            <a:pPr indent="0" lvl="0" marL="0" rtl="0" algn="l">
+              <a:spcBef>
+                <a:spcPts val="0"/>
+              </a:spcBef>
+              <a:spcAft>
+                <a:spcPts val="0"/>
+              </a:spcAft>
+              <a:buNone/>
+            </a:pPr>
+            <a:r>
+              <a:t/>
+            </a:r>
+            <a:endParaRPr/>
+          </a:p>
+          <a:p>
+            <a:pPr indent="0" lvl="0" marL="0" rtl="0" algn="l">
+              <a:spcBef>
+                <a:spcPts val="0"/>
+              </a:spcBef>
+              <a:spcAft>
+                <a:spcPts val="0"/>
+              </a:spcAft>
+              <a:buNone/>
+            </a:pPr>
+            <a:r>
+              <a:rPr lang="en"/>
+              <a:t>Also taking time and experimenting with additional machine learning models. </a:t>
+            </a:r>
+            <a:endParaRPr/>
+          </a:p>
+        </p:txBody>
+      </p:sp>
+    </p:spTree>
+  </p:cSld>
+  <p:clrMapOvr>
+    <a:masterClrMapping/>
+  </p:clrMapOvr>
+</p:notes>
+</file>
+
+<file path=ppt/notesSlides/notesSlide22.xml><?xml version="1.0" encoding="utf-8"?>
+<p:notes xmlns:a="http://schemas.openxmlformats.org/drawingml/2006/main" xmlns:r="http://schemas.openxmlformats.org/officeDocument/2006/relationships" xmlns:mc="http://schemas.openxmlformats.org/markup-compatibility/2006" xmlns:mv="urn:schemas-microsoft-com:mac:vml" xmlns:p="http://schemas.openxmlformats.org/presentationml/2006/main" xmlns:c="http://schemas.openxmlformats.org/drawingml/2006/chart" xmlns:dgm="http://schemas.openxmlformats.org/drawingml/2006/diagram" xmlns:o="urn:schemas-microsoft-com:office:office" xmlns:v="urn:schemas-microsoft-com:vml" xmlns:pvml="urn:schemas-microsoft-com:office:powerpoint" xmlns:com="http://schemas.openxmlformats.org/drawingml/2006/compatibility" xmlns:p14="http://schemas.microsoft.com/office/powerpoint/2010/main" xmlns:p15="http://schemas.microsoft.com/office/powerpoint/2012/main" xmlns:ahyp="http://schemas.microsoft.com/office/drawing/2018/hyperlinkcolor" showMasterPhAnim="0" showMasterSp="0">
+  <p:cSld>
+    <p:spTree>
+      <p:nvGrpSpPr>
+        <p:cNvPr id="273" name="Shape 273"/>
+        <p:cNvGrpSpPr/>
+        <p:nvPr/>
+      </p:nvGrpSpPr>
+      <p:grpSpPr>
+        <a:xfrm>
+          <a:off x="0" y="0"/>
+          <a:ext cx="0" cy="0"/>
+          <a:chOff x="0" y="0"/>
+          <a:chExt cx="0" cy="0"/>
+        </a:xfrm>
+      </p:grpSpPr>
+      <p:sp>
+        <p:nvSpPr>
+          <p:cNvPr id="274" name="Google Shape;274;ge7eb311e9c_0_21:notes"/>
+          <p:cNvSpPr/>
+          <p:nvPr>
+            <p:ph idx="2" type="sldImg"/>
+          </p:nvPr>
+        </p:nvSpPr>
+        <p:spPr>
+          <a:xfrm>
+            <a:off x="381300" y="685800"/>
+            <a:ext cx="6096000" cy="3429000"/>
+          </a:xfrm>
+          <a:custGeom>
+            <a:rect b="b" l="l" r="r" t="t"/>
+            <a:pathLst>
+              <a:path extrusionOk="0" h="120000" w="120000">
+                <a:moveTo>
+                  <a:pt x="0" y="0"/>
+                </a:moveTo>
+                <a:lnTo>
+                  <a:pt x="120000" y="0"/>
+                </a:lnTo>
+                <a:lnTo>
+                  <a:pt x="120000" y="120000"/>
+                </a:lnTo>
+                <a:lnTo>
+                  <a:pt x="0" y="120000"/>
+                </a:lnTo>
+                <a:close/>
+              </a:path>
+            </a:pathLst>
+          </a:custGeom>
+        </p:spPr>
+      </p:sp>
+      <p:sp>
+        <p:nvSpPr>
+          <p:cNvPr id="275" name="Google Shape;275;ge7eb311e9c_0_21:notes"/>
+          <p:cNvSpPr txBox="1"/>
+          <p:nvPr>
+            <p:ph idx="1" type="body"/>
+          </p:nvPr>
+        </p:nvSpPr>
+        <p:spPr>
+          <a:xfrm>
+            <a:off x="685800" y="4343400"/>
+            <a:ext cx="5486400" cy="4114800"/>
+          </a:xfrm>
+          <a:prstGeom prst="rect">
+            <a:avLst/>
+          </a:prstGeom>
+        </p:spPr>
+        <p:txBody>
+          <a:bodyPr anchorCtr="0" anchor="t" bIns="91425" lIns="91425" spcFirstLastPara="1" rIns="91425" wrap="square" tIns="91425">
+            <a:noAutofit/>
+          </a:bodyPr>
+          <a:lstStyle/>
+          <a:p>
+            <a:pPr indent="0" lvl="0" marL="0" rtl="0" algn="l">
+              <a:spcBef>
+                <a:spcPts val="0"/>
+              </a:spcBef>
+              <a:spcAft>
+                <a:spcPts val="0"/>
+              </a:spcAft>
+              <a:buNone/>
+            </a:pPr>
+            <a:r>
+              <a:rPr lang="en"/>
+              <a:t>Listed are all the technologies we used throughout each step of our project. </a:t>
+            </a:r>
+            <a:endParaRPr/>
+          </a:p>
+          <a:p>
+            <a:pPr indent="0" lvl="0" marL="0" rtl="0" algn="l">
+              <a:spcBef>
+                <a:spcPts val="0"/>
+              </a:spcBef>
+              <a:spcAft>
+                <a:spcPts val="0"/>
+              </a:spcAft>
+              <a:buNone/>
+            </a:pPr>
+            <a:r>
+              <a:t/>
+            </a:r>
+            <a:endParaRPr/>
+          </a:p>
+        </p:txBody>
+      </p:sp>
+    </p:spTree>
+  </p:cSld>
+  <p:clrMapOvr>
+    <a:masterClrMapping/>
+  </p:clrMapOvr>
+</p:notes>
+</file>
+
+<file path=ppt/notesSlides/notesSlide23.xml><?xml version="1.0" encoding="utf-8"?>
+<p:notes xmlns:a="http://schemas.openxmlformats.org/drawingml/2006/main" xmlns:r="http://schemas.openxmlformats.org/officeDocument/2006/relationships" xmlns:mc="http://schemas.openxmlformats.org/markup-compatibility/2006" xmlns:mv="urn:schemas-microsoft-com:mac:vml" xmlns:p="http://schemas.openxmlformats.org/presentationml/2006/main" xmlns:c="http://schemas.openxmlformats.org/drawingml/2006/chart" xmlns:dgm="http://schemas.openxmlformats.org/drawingml/2006/diagram" xmlns:o="urn:schemas-microsoft-com:office:office" xmlns:v="urn:schemas-microsoft-com:vml" xmlns:pvml="urn:schemas-microsoft-com:office:powerpoint" xmlns:com="http://schemas.openxmlformats.org/drawingml/2006/compatibility" xmlns:p14="http://schemas.microsoft.com/office/powerpoint/2010/main" xmlns:p15="http://schemas.microsoft.com/office/powerpoint/2012/main" xmlns:ahyp="http://schemas.microsoft.com/office/drawing/2018/hyperlinkcolor" showMasterPhAnim="0" showMasterSp="0">
+  <p:cSld>
+    <p:spTree>
+      <p:nvGrpSpPr>
+        <p:cNvPr id="280" name="Shape 280"/>
+        <p:cNvGrpSpPr/>
+        <p:nvPr/>
+      </p:nvGrpSpPr>
+      <p:grpSpPr>
+        <a:xfrm>
+          <a:off x="0" y="0"/>
+          <a:ext cx="0" cy="0"/>
+          <a:chOff x="0" y="0"/>
+          <a:chExt cx="0" cy="0"/>
+        </a:xfrm>
+      </p:grpSpPr>
+      <p:sp>
+        <p:nvSpPr>
+          <p:cNvPr id="281" name="Google Shape;281;ge552042212_0_334:notes"/>
+          <p:cNvSpPr/>
+          <p:nvPr>
+            <p:ph idx="2" type="sldImg"/>
+          </p:nvPr>
+        </p:nvSpPr>
+        <p:spPr>
+          <a:xfrm>
+            <a:off x="381300" y="685800"/>
+            <a:ext cx="6096000" cy="3429000"/>
+          </a:xfrm>
+          <a:custGeom>
+            <a:rect b="b" l="l" r="r" t="t"/>
+            <a:pathLst>
+              <a:path extrusionOk="0" h="120000" w="120000">
+                <a:moveTo>
+                  <a:pt x="0" y="0"/>
+                </a:moveTo>
+                <a:lnTo>
+                  <a:pt x="120000" y="0"/>
+                </a:lnTo>
+                <a:lnTo>
+                  <a:pt x="120000" y="120000"/>
+                </a:lnTo>
+                <a:lnTo>
+                  <a:pt x="0" y="120000"/>
+                </a:lnTo>
+                <a:close/>
+              </a:path>
+            </a:pathLst>
+          </a:custGeom>
+        </p:spPr>
+      </p:sp>
+      <p:sp>
+        <p:nvSpPr>
+          <p:cNvPr id="282" name="Google Shape;282;ge552042212_0_334:notes"/>
           <p:cNvSpPr txBox="1"/>
           <p:nvPr>
             <p:ph idx="1" type="body"/>
@@ -2086,7 +3496,24 @@
               <a:buNone/>
             </a:pPr>
             <a:r>
-              <a:t/>
+              <a:rPr lang="en"/>
+              <a:t>Data is active permits administered by the Beer Permit Board</a:t>
+            </a:r>
+            <a:endParaRPr/>
+          </a:p>
+          <a:p>
+            <a:pPr indent="0" lvl="0" marL="0" rtl="0" algn="l">
+              <a:spcBef>
+                <a:spcPts val="0"/>
+              </a:spcBef>
+              <a:spcAft>
+                <a:spcPts val="0"/>
+              </a:spcAft>
+              <a:buNone/>
+            </a:pPr>
+            <a:r>
+              <a:rPr lang="en"/>
+              <a:t>Total active permits: 1,305 (before cleaning)</a:t>
             </a:r>
             <a:endParaRPr/>
           </a:p>
@@ -2175,7 +3602,7 @@
           </a:bodyPr>
           <a:lstStyle/>
           <a:p>
-            <a:pPr indent="-342900" lvl="0" marL="457200" rtl="0" algn="l">
+            <a:pPr indent="-311150" lvl="0" marL="457200" rtl="0" algn="l">
               <a:lnSpc>
                 <a:spcPct val="115000"/>
               </a:lnSpc>
@@ -2188,12 +3615,12 @@
               <a:buClr>
                 <a:srgbClr val="233A44"/>
               </a:buClr>
-              <a:buSzPts val="1800"/>
+              <a:buSzPts val="1300"/>
               <a:buFont typeface="Calibri"/>
               <a:buChar char="★"/>
             </a:pPr>
             <a:r>
-              <a:rPr lang="en" sz="1800">
+              <a:rPr lang="en" sz="1300">
                 <a:solidFill>
                   <a:srgbClr val="233A44"/>
                 </a:solidFill>
@@ -2202,9 +3629,9 @@
                 <a:cs typeface="Calibri"/>
                 <a:sym typeface="Calibri"/>
               </a:rPr>
-              <a:t>permit_number: permit unique identifier [1]</a:t>
-            </a:r>
-            <a:endParaRPr sz="1800">
+              <a:t>permit_number: permit unique identifier</a:t>
+            </a:r>
+            <a:endParaRPr sz="1300">
               <a:solidFill>
                 <a:srgbClr val="233A44"/>
               </a:solidFill>
@@ -2215,7 +3642,7 @@
             </a:endParaRPr>
           </a:p>
           <a:p>
-            <a:pPr indent="-342900" lvl="0" marL="457200" rtl="0" algn="l">
+            <a:pPr indent="-311150" lvl="0" marL="457200" rtl="0" algn="l">
               <a:lnSpc>
                 <a:spcPct val="115000"/>
               </a:lnSpc>
@@ -2228,12 +3655,12 @@
               <a:buClr>
                 <a:srgbClr val="233A44"/>
               </a:buClr>
-              <a:buSzPts val="1800"/>
+              <a:buSzPts val="1300"/>
               <a:buFont typeface="Calibri"/>
               <a:buChar char="★"/>
             </a:pPr>
             <a:r>
-              <a:rPr lang="en" sz="1800">
+              <a:rPr lang="en" sz="1300">
                 <a:solidFill>
                   <a:srgbClr val="233A44"/>
                 </a:solidFill>
@@ -2242,9 +3669,9 @@
                 <a:cs typeface="Calibri"/>
                 <a:sym typeface="Calibri"/>
               </a:rPr>
-              <a:t>permit_subtype: “System code for the permit subtype” [1]</a:t>
-            </a:r>
-            <a:endParaRPr sz="1800">
+              <a:t>permit_subtype: On-sale vs off sale vs on/off sale vs special - we are interested in on and on/off</a:t>
+            </a:r>
+            <a:endParaRPr sz="1300">
               <a:solidFill>
                 <a:srgbClr val="233A44"/>
               </a:solidFill>
@@ -2255,7 +3682,7 @@
             </a:endParaRPr>
           </a:p>
           <a:p>
-            <a:pPr indent="-342900" lvl="0" marL="457200" rtl="0" algn="l">
+            <a:pPr indent="-311150" lvl="0" marL="457200" rtl="0" algn="l">
               <a:lnSpc>
                 <a:spcPct val="115000"/>
               </a:lnSpc>
@@ -2268,252 +3695,12 @@
               <a:buClr>
                 <a:srgbClr val="233A44"/>
               </a:buClr>
-              <a:buSzPts val="1800"/>
+              <a:buSzPts val="1300"/>
               <a:buFont typeface="Calibri"/>
               <a:buChar char="★"/>
             </a:pPr>
             <a:r>
-              <a:rPr lang="en" sz="1800">
-                <a:solidFill>
-                  <a:srgbClr val="233A44"/>
-                </a:solidFill>
-                <a:latin typeface="Calibri"/>
-                <a:ea typeface="Calibri"/>
-                <a:cs typeface="Calibri"/>
-                <a:sym typeface="Calibri"/>
-              </a:rPr>
-              <a:t>date_entered: “Date the permit was entered into the system” [1]</a:t>
-            </a:r>
-            <a:endParaRPr sz="1800">
-              <a:solidFill>
-                <a:srgbClr val="233A44"/>
-              </a:solidFill>
-              <a:latin typeface="Calibri"/>
-              <a:ea typeface="Calibri"/>
-              <a:cs typeface="Calibri"/>
-              <a:sym typeface="Calibri"/>
-            </a:endParaRPr>
-          </a:p>
-          <a:p>
-            <a:pPr indent="-342900" lvl="0" marL="457200" rtl="0" algn="l">
-              <a:lnSpc>
-                <a:spcPct val="115000"/>
-              </a:lnSpc>
-              <a:spcBef>
-                <a:spcPts val="0"/>
-              </a:spcBef>
-              <a:spcAft>
-                <a:spcPts val="0"/>
-              </a:spcAft>
-              <a:buClr>
-                <a:srgbClr val="233A44"/>
-              </a:buClr>
-              <a:buSzPts val="1800"/>
-              <a:buFont typeface="Calibri"/>
-              <a:buChar char="★"/>
-            </a:pPr>
-            <a:r>
-              <a:rPr lang="en" sz="1800">
-                <a:solidFill>
-                  <a:srgbClr val="233A44"/>
-                </a:solidFill>
-                <a:latin typeface="Calibri"/>
-                <a:ea typeface="Calibri"/>
-                <a:cs typeface="Calibri"/>
-                <a:sym typeface="Calibri"/>
-              </a:rPr>
-              <a:t>date_issued: permit issue date [1]</a:t>
-            </a:r>
-            <a:endParaRPr sz="1800">
-              <a:solidFill>
-                <a:srgbClr val="233A44"/>
-              </a:solidFill>
-              <a:latin typeface="Calibri"/>
-              <a:ea typeface="Calibri"/>
-              <a:cs typeface="Calibri"/>
-              <a:sym typeface="Calibri"/>
-            </a:endParaRPr>
-          </a:p>
-          <a:p>
-            <a:pPr indent="-342900" lvl="0" marL="457200" rtl="0" algn="l">
-              <a:lnSpc>
-                <a:spcPct val="115000"/>
-              </a:lnSpc>
-              <a:spcBef>
-                <a:spcPts val="0"/>
-              </a:spcBef>
-              <a:spcAft>
-                <a:spcPts val="0"/>
-              </a:spcAft>
-              <a:buClr>
-                <a:srgbClr val="233A44"/>
-              </a:buClr>
-              <a:buSzPts val="1800"/>
-              <a:buFont typeface="Calibri"/>
-              <a:buChar char="★"/>
-            </a:pPr>
-            <a:r>
-              <a:rPr lang="en" sz="1800">
-                <a:solidFill>
-                  <a:srgbClr val="233A44"/>
-                </a:solidFill>
-                <a:latin typeface="Calibri"/>
-                <a:ea typeface="Calibri"/>
-                <a:cs typeface="Calibri"/>
-                <a:sym typeface="Calibri"/>
-              </a:rPr>
-              <a:t>business_name: “Name of the business to which the permit is issued” [1]</a:t>
-            </a:r>
-            <a:endParaRPr sz="1800">
-              <a:solidFill>
-                <a:srgbClr val="233A44"/>
-              </a:solidFill>
-              <a:latin typeface="Calibri"/>
-              <a:ea typeface="Calibri"/>
-              <a:cs typeface="Calibri"/>
-              <a:sym typeface="Calibri"/>
-            </a:endParaRPr>
-          </a:p>
-          <a:p>
-            <a:pPr indent="-342900" lvl="0" marL="457200" rtl="0" algn="l">
-              <a:lnSpc>
-                <a:spcPct val="115000"/>
-              </a:lnSpc>
-              <a:spcBef>
-                <a:spcPts val="0"/>
-              </a:spcBef>
-              <a:spcAft>
-                <a:spcPts val="0"/>
-              </a:spcAft>
-              <a:buClr>
-                <a:srgbClr val="233A44"/>
-              </a:buClr>
-              <a:buSzPts val="1800"/>
-              <a:buFont typeface="Calibri"/>
-              <a:buChar char="★"/>
-            </a:pPr>
-            <a:r>
-              <a:rPr lang="en" sz="1800">
-                <a:solidFill>
-                  <a:srgbClr val="233A44"/>
-                </a:solidFill>
-                <a:latin typeface="Calibri"/>
-                <a:ea typeface="Calibri"/>
-                <a:cs typeface="Calibri"/>
-                <a:sym typeface="Calibri"/>
-              </a:rPr>
-              <a:t>zip: business location zip code [1]</a:t>
-            </a:r>
-            <a:endParaRPr sz="1800">
-              <a:solidFill>
-                <a:srgbClr val="233A44"/>
-              </a:solidFill>
-              <a:latin typeface="Calibri"/>
-              <a:ea typeface="Calibri"/>
-              <a:cs typeface="Calibri"/>
-              <a:sym typeface="Calibri"/>
-            </a:endParaRPr>
-          </a:p>
-          <a:p>
-            <a:pPr indent="-342900" lvl="0" marL="457200" rtl="0" algn="l">
-              <a:lnSpc>
-                <a:spcPct val="115000"/>
-              </a:lnSpc>
-              <a:spcBef>
-                <a:spcPts val="0"/>
-              </a:spcBef>
-              <a:spcAft>
-                <a:spcPts val="0"/>
-              </a:spcAft>
-              <a:buClr>
-                <a:srgbClr val="233A44"/>
-              </a:buClr>
-              <a:buSzPts val="1800"/>
-              <a:buFont typeface="Calibri"/>
-              <a:buChar char="★"/>
-            </a:pPr>
-            <a:r>
-              <a:rPr lang="en" sz="1800">
-                <a:solidFill>
-                  <a:srgbClr val="233A44"/>
-                </a:solidFill>
-                <a:latin typeface="Calibri"/>
-                <a:ea typeface="Calibri"/>
-                <a:cs typeface="Calibri"/>
-                <a:sym typeface="Calibri"/>
-              </a:rPr>
-              <a:t>latitude: latitude coordinate of business location</a:t>
-            </a:r>
-            <a:endParaRPr sz="1800">
-              <a:solidFill>
-                <a:srgbClr val="233A44"/>
-              </a:solidFill>
-              <a:latin typeface="Calibri"/>
-              <a:ea typeface="Calibri"/>
-              <a:cs typeface="Calibri"/>
-              <a:sym typeface="Calibri"/>
-            </a:endParaRPr>
-          </a:p>
-          <a:p>
-            <a:pPr indent="-342900" lvl="0" marL="457200" rtl="0" algn="l">
-              <a:lnSpc>
-                <a:spcPct val="115000"/>
-              </a:lnSpc>
-              <a:spcBef>
-                <a:spcPts val="0"/>
-              </a:spcBef>
-              <a:spcAft>
-                <a:spcPts val="0"/>
-              </a:spcAft>
-              <a:buClr>
-                <a:srgbClr val="233A44"/>
-              </a:buClr>
-              <a:buSzPts val="1800"/>
-              <a:buFont typeface="Calibri"/>
-              <a:buChar char="★"/>
-            </a:pPr>
-            <a:r>
-              <a:rPr lang="en" sz="1800">
-                <a:solidFill>
-                  <a:srgbClr val="233A44"/>
-                </a:solidFill>
-                <a:latin typeface="Calibri"/>
-                <a:ea typeface="Calibri"/>
-                <a:cs typeface="Calibri"/>
-                <a:sym typeface="Calibri"/>
-              </a:rPr>
-              <a:t>longitude: longitude coordinate of business location</a:t>
-            </a:r>
-            <a:endParaRPr sz="1800">
-              <a:solidFill>
-                <a:srgbClr val="233A44"/>
-              </a:solidFill>
-              <a:latin typeface="Calibri"/>
-              <a:ea typeface="Calibri"/>
-              <a:cs typeface="Calibri"/>
-              <a:sym typeface="Calibri"/>
-            </a:endParaRPr>
-          </a:p>
-          <a:p>
-            <a:pPr indent="-342900" lvl="0" marL="457200" rtl="0" algn="l">
-              <a:lnSpc>
-                <a:spcPct val="115000"/>
-              </a:lnSpc>
-              <a:spcBef>
-                <a:spcPts val="0"/>
-              </a:spcBef>
-              <a:spcAft>
-                <a:spcPts val="0"/>
-              </a:spcAft>
-              <a:buClr>
-                <a:srgbClr val="233A44"/>
-              </a:buClr>
-              <a:buSzPts val="1800"/>
-              <a:buFont typeface="Calibri"/>
-              <a:buChar char="★"/>
-            </a:pPr>
-            <a:r>
-              <a:rPr lang="en" sz="1800">
+              <a:rPr lang="en" sz="1300">
                 <a:solidFill>
                   <a:srgbClr val="233A44"/>
                 </a:solidFill>
@@ -2524,7 +3711,7 @@
               </a:rPr>
               <a:t>permit_duration: number of days business has held permit</a:t>
             </a:r>
-            <a:endParaRPr sz="1800">
+            <a:endParaRPr sz="1300">
               <a:solidFill>
                 <a:srgbClr val="233A44"/>
               </a:solidFill>
@@ -2553,7 +3740,7 @@
               <a:buChar char="○"/>
             </a:pPr>
             <a:r>
-              <a:rPr lang="en" sz="1600">
+              <a:rPr lang="en">
                 <a:solidFill>
                   <a:srgbClr val="233A44"/>
                 </a:solidFill>
@@ -2661,7 +3848,8 @@
               <a:buNone/>
             </a:pPr>
             <a:r>
-              <a:t/>
+              <a:rPr lang="en"/>
+              <a:t>Age was one of the leading factors of our demographic analysis - consumers between the age of 21-34 frequent beer serving establishments more than any other age group (SBDC.org)</a:t>
             </a:r>
             <a:endParaRPr/>
           </a:p>
@@ -2760,7 +3948,24 @@
               <a:buNone/>
             </a:pPr>
             <a:r>
-              <a:t/>
+              <a:rPr lang="en"/>
+              <a:t>Our group focused on the Average Household income by zip code.</a:t>
+            </a:r>
+            <a:endParaRPr/>
+          </a:p>
+          <a:p>
+            <a:pPr indent="0" lvl="0" marL="0" rtl="0" algn="l">
+              <a:spcBef>
+                <a:spcPts val="0"/>
+              </a:spcBef>
+              <a:spcAft>
+                <a:spcPts val="0"/>
+              </a:spcAft>
+              <a:buNone/>
+            </a:pPr>
+            <a:r>
+              <a:rPr lang="en"/>
+              <a:t>According to Restaurant.org, spending at restaurants is higher for families with higher household incomes.</a:t>
             </a:r>
             <a:endParaRPr/>
           </a:p>
@@ -2859,7 +4064,8 @@
               <a:buNone/>
             </a:pPr>
             <a:r>
-              <a:t/>
+              <a:rPr lang="en"/>
+              <a:t>Demographics data can be used to focus your search for a location to open your specific restaurant.</a:t>
             </a:r>
             <a:endParaRPr/>
           </a:p>
@@ -2948,19 +4154,49 @@
           </a:bodyPr>
           <a:lstStyle/>
           <a:p>
-            <a:pPr indent="0" lvl="0" marL="0" rtl="0" algn="l">
-              <a:spcBef>
-                <a:spcPts val="0"/>
-              </a:spcBef>
-              <a:spcAft>
-                <a:spcPts val="0"/>
-              </a:spcAft>
-              <a:buNone/>
-            </a:pPr>
-            <a:r>
-              <a:t/>
-            </a:r>
-            <a:endParaRPr/>
+            <a:pPr indent="-298450" lvl="0" marL="457200" rtl="0" algn="l">
+              <a:spcBef>
+                <a:spcPts val="0"/>
+              </a:spcBef>
+              <a:spcAft>
+                <a:spcPts val="0"/>
+              </a:spcAft>
+              <a:buSzPts val="1100"/>
+              <a:buAutoNum type="arabicPeriod"/>
+            </a:pPr>
+            <a:r>
+              <a:rPr lang="en"/>
+              <a:t>Using the previously mentio</a:t>
+            </a:r>
+            <a:r>
+              <a:rPr lang="en">
+                <a:solidFill>
+                  <a:schemeClr val="dk1"/>
+                </a:solidFill>
+              </a:rPr>
+              <a:t>ned </a:t>
+            </a:r>
+            <a:r>
+              <a:rPr lang="en">
+                <a:solidFill>
+                  <a:schemeClr val="dk1"/>
+                </a:solidFill>
+              </a:rPr>
+              <a:t>beer permit and demographic datasets, we hoped to discover </a:t>
+            </a:r>
+            <a:r>
+              <a:rPr lang="en">
+                <a:solidFill>
+                  <a:schemeClr val="dk1"/>
+                </a:solidFill>
+              </a:rPr>
+              <a:t>in which zip code one would be more successful when opening a beer serving establishment in Davidson County.</a:t>
+            </a:r>
+            <a:endParaRPr>
+              <a:solidFill>
+                <a:schemeClr val="dk1"/>
+              </a:solidFill>
+            </a:endParaRPr>
           </a:p>
         </p:txBody>
       </p:sp>
@@ -3047,17 +4283,19 @@
           </a:bodyPr>
           <a:lstStyle/>
           <a:p>
-            <a:pPr indent="0" lvl="0" marL="0" rtl="0" algn="l">
-              <a:spcBef>
-                <a:spcPts val="0"/>
-              </a:spcBef>
-              <a:spcAft>
-                <a:spcPts val="0"/>
-              </a:spcAft>
-              <a:buNone/>
-            </a:pPr>
-            <a:r>
-              <a:t/>
+            <a:pPr indent="-298450" lvl="0" marL="457200" rtl="0" algn="l">
+              <a:spcBef>
+                <a:spcPts val="0"/>
+              </a:spcBef>
+              <a:spcAft>
+                <a:spcPts val="0"/>
+              </a:spcAft>
+              <a:buSzPts val="1100"/>
+              <a:buAutoNum type="arabicPeriod"/>
+            </a:pPr>
+            <a:r>
+              <a:rPr lang="en"/>
+              <a:t>Now I will discuss the initial steps we took to explore our datasets and start setting up our database and machine learning model.</a:t>
             </a:r>
             <a:endParaRPr/>
           </a:p>
@@ -11148,7 +12386,7 @@
         </p:spPr>
         <p:txBody>
           <a:bodyPr anchorCtr="0" anchor="t" bIns="91425" lIns="91425" spcFirstLastPara="1" rIns="91425" wrap="square" tIns="91425">
-            <a:normAutofit fontScale="92500"/>
+            <a:normAutofit fontScale="85000" lnSpcReduction="20000"/>
           </a:bodyPr>
           <a:lstStyle/>
           <a:p>
@@ -11162,8 +12400,24 @@
               <a:buNone/>
             </a:pPr>
             <a:r>
+              <a:rPr b="1" lang="en"/>
+              <a:t>The Hermitage Group</a:t>
+            </a:r>
+            <a:endParaRPr b="1"/>
+          </a:p>
+          <a:p>
+            <a:pPr indent="0" lvl="0" marL="0" rtl="0" algn="ctr">
+              <a:spcBef>
+                <a:spcPts val="0"/>
+              </a:spcBef>
+              <a:spcAft>
+                <a:spcPts val="0"/>
+              </a:spcAft>
+              <a:buNone/>
+            </a:pPr>
+            <a:r>
               <a:rPr lang="en"/>
-              <a:t>By Samantha Wright, Ryan Walkley, Andrew Holt, and Hanna Kim</a:t>
+              <a:t>Samantha Wright, Ryan Walkley, Andrew Holt, and Hanna Kim</a:t>
             </a:r>
             <a:endParaRPr/>
           </a:p>
@@ -12013,7 +13267,7 @@
         </p:nvPicPr>
         <p:blipFill>
           <a:blip r:embed="rId3">
-            <a:alphaModFix amt="25000"/>
+            <a:alphaModFix amt="20000"/>
           </a:blip>
           <a:stretch>
             <a:fillRect/>
@@ -12318,7 +13572,7 @@
         </p:nvPicPr>
         <p:blipFill>
           <a:blip r:embed="rId3">
-            <a:alphaModFix amt="25000"/>
+            <a:alphaModFix amt="20000"/>
           </a:blip>
           <a:stretch>
             <a:fillRect/>
@@ -12520,6 +13774,23 @@
             <a:r>
               <a:rPr lang="en" sz="1600"/>
               <a:t>Also added it to another S3 bucket for public use</a:t>
+            </a:r>
+            <a:endParaRPr sz="1600"/>
+          </a:p>
+          <a:p>
+            <a:pPr indent="-330200" lvl="0" marL="457200" rtl="0" algn="l">
+              <a:spcBef>
+                <a:spcPts val="0"/>
+              </a:spcBef>
+              <a:spcAft>
+                <a:spcPts val="0"/>
+              </a:spcAft>
+              <a:buSzPts val="1600"/>
+              <a:buChar char="★"/>
+            </a:pPr>
+            <a:r>
+              <a:rPr lang="en" sz="1600"/>
+              <a:t>Utilized Pyspark to connect database to ML model using Google Colab</a:t>
             </a:r>
             <a:endParaRPr sz="1600"/>
           </a:p>
@@ -12662,8 +13933,8 @@
         </p:blipFill>
         <p:spPr>
           <a:xfrm>
-            <a:off x="2118062" y="1632250"/>
-            <a:ext cx="4907873" cy="2943425"/>
+            <a:off x="1660000" y="1573750"/>
+            <a:ext cx="5269226" cy="3276050"/>
           </a:xfrm>
           <a:prstGeom prst="rect">
             <a:avLst/>
@@ -12882,7 +14153,7 @@
         </p:nvPicPr>
         <p:blipFill>
           <a:blip r:embed="rId3">
-            <a:alphaModFix amt="25000"/>
+            <a:alphaModFix amt="20000"/>
           </a:blip>
           <a:stretch>
             <a:fillRect/>
@@ -13091,7 +14362,7 @@
         </p:nvPicPr>
         <p:blipFill>
           <a:blip r:embed="rId3">
-            <a:alphaModFix amt="25000"/>
+            <a:alphaModFix amt="20000"/>
           </a:blip>
           <a:stretch>
             <a:fillRect/>
@@ -13099,8 +14370,8 @@
         </p:blipFill>
         <p:spPr>
           <a:xfrm>
-            <a:off x="196350" y="203600"/>
-            <a:ext cx="8751199" cy="4753450"/>
+            <a:off x="206975" y="203600"/>
+            <a:ext cx="8729851" cy="4729424"/>
           </a:xfrm>
           <a:prstGeom prst="rect">
             <a:avLst/>
@@ -13121,8 +14392,8 @@
         </p:nvSpPr>
         <p:spPr>
           <a:xfrm>
-            <a:off x="819150" y="312050"/>
-            <a:ext cx="7505700" cy="680400"/>
+            <a:off x="819150" y="781300"/>
+            <a:ext cx="7505700" cy="761700"/>
           </a:xfrm>
           <a:prstGeom prst="rect">
             <a:avLst/>
@@ -13145,7 +14416,7 @@
             </a:pPr>
             <a:r>
               <a:rPr lang="en"/>
-              <a:t>Technologies Used</a:t>
+              <a:t>Results of Analysis</a:t>
             </a:r>
             <a:endParaRPr/>
           </a:p>
@@ -13161,8 +14432,8 @@
         </p:nvSpPr>
         <p:spPr>
           <a:xfrm>
-            <a:off x="819150" y="992450"/>
-            <a:ext cx="7505700" cy="3788100"/>
+            <a:off x="819150" y="1543000"/>
+            <a:ext cx="7505700" cy="2895600"/>
           </a:xfrm>
           <a:prstGeom prst="rect">
             <a:avLst/>
@@ -13170,7 +14441,7 @@
         </p:spPr>
         <p:txBody>
           <a:bodyPr anchorCtr="0" anchor="t" bIns="91425" lIns="91425" spcFirstLastPara="1" rIns="91425" wrap="square" tIns="91425">
-            <a:normAutofit lnSpcReduction="10000"/>
+            <a:normAutofit/>
           </a:bodyPr>
           <a:lstStyle/>
           <a:p>
@@ -13186,7 +14457,7 @@
             </a:pPr>
             <a:r>
               <a:rPr lang="en" sz="1800"/>
-              <a:t>Data cleaning and analysis:</a:t>
+              <a:t>Further vicinity from downtown Nashville = longer permit duration</a:t>
             </a:r>
             <a:endParaRPr sz="1800"/>
           </a:p>
@@ -13203,9 +14474,34 @@
             </a:pPr>
             <a:r>
               <a:rPr lang="en" sz="1600"/>
-              <a:t>Pandas for cleaning and transforming data and exploratory analysis</a:t>
+              <a:t>Data is limited to current active permits in Davidson county</a:t>
             </a:r>
             <a:endParaRPr sz="1600"/>
+          </a:p>
+          <a:p>
+            <a:pPr indent="-342900" lvl="0" marL="457200" rtl="0" algn="l">
+              <a:spcBef>
+                <a:spcPts val="0"/>
+              </a:spcBef>
+              <a:spcAft>
+                <a:spcPts val="0"/>
+              </a:spcAft>
+              <a:buSzPts val="1800"/>
+              <a:buChar char="★"/>
+            </a:pPr>
+            <a:r>
+              <a:rPr lang="en" sz="1800"/>
+              <a:t>When establishing business away from downtown Nashville, need to consider </a:t>
+            </a:r>
+            <a:r>
+              <a:rPr lang="en" sz="1800"/>
+              <a:t>desires</a:t>
+            </a:r>
+            <a:r>
+              <a:rPr lang="en" sz="1800"/>
+              <a:t> of local populations</a:t>
+            </a:r>
+            <a:endParaRPr sz="1800"/>
           </a:p>
           <a:p>
             <a:pPr indent="-330200" lvl="1" marL="914400" rtl="0" algn="l">
@@ -13220,26 +14516,43 @@
             </a:pPr>
             <a:r>
               <a:rPr lang="en" sz="1600"/>
-              <a:t>Python for further analysis</a:t>
+              <a:t>Certain zip codes have higher concentrations of certain demographic groups</a:t>
             </a:r>
             <a:endParaRPr sz="1600"/>
           </a:p>
           <a:p>
-            <a:pPr indent="-342900" lvl="0" marL="457200" rtl="0" algn="l">
-              <a:spcBef>
-                <a:spcPts val="0"/>
-              </a:spcBef>
-              <a:spcAft>
-                <a:spcPts val="0"/>
-              </a:spcAft>
-              <a:buSzPts val="1800"/>
-              <a:buChar char="★"/>
-            </a:pPr>
-            <a:r>
-              <a:rPr lang="en" sz="1800"/>
-              <a:t>Database storage</a:t>
-            </a:r>
-            <a:endParaRPr sz="1800"/>
+            <a:pPr indent="-330200" lvl="2" marL="1371600" rtl="0" algn="l">
+              <a:spcBef>
+                <a:spcPts val="0"/>
+              </a:spcBef>
+              <a:spcAft>
+                <a:spcPts val="0"/>
+              </a:spcAft>
+              <a:buSzPts val="1600"/>
+              <a:buChar char="■"/>
+            </a:pPr>
+            <a:r>
+              <a:rPr lang="en" sz="1600"/>
+              <a:t>Ex. 37013/37211 have highest concentration of 25-34 year olds</a:t>
+            </a:r>
+            <a:endParaRPr sz="1600"/>
+          </a:p>
+          <a:p>
+            <a:pPr indent="-330200" lvl="2" marL="1371600" rtl="0" algn="l">
+              <a:spcBef>
+                <a:spcPts val="0"/>
+              </a:spcBef>
+              <a:spcAft>
+                <a:spcPts val="0"/>
+              </a:spcAft>
+              <a:buSzPts val="1600"/>
+              <a:buChar char="■"/>
+            </a:pPr>
+            <a:r>
+              <a:rPr lang="en" sz="1600"/>
+              <a:t>Ex. 37205/37215 have highest household income</a:t>
+            </a:r>
+            <a:endParaRPr sz="1600"/>
           </a:p>
           <a:p>
             <a:pPr indent="-330200" lvl="1" marL="914400" rtl="0" algn="l">
@@ -13254,143 +14567,7 @@
             </a:pPr>
             <a:r>
               <a:rPr lang="en" sz="1600"/>
-              <a:t>Postgres</a:t>
-            </a:r>
-            <a:endParaRPr sz="1600"/>
-          </a:p>
-          <a:p>
-            <a:pPr indent="-330200" lvl="2" marL="1371600" rtl="0" algn="l">
-              <a:spcBef>
-                <a:spcPts val="0"/>
-              </a:spcBef>
-              <a:spcAft>
-                <a:spcPts val="0"/>
-              </a:spcAft>
-              <a:buSzPts val="1600"/>
-              <a:buChar char="■"/>
-            </a:pPr>
-            <a:r>
-              <a:rPr lang="en" sz="1600"/>
-              <a:t>Flask for data display</a:t>
-            </a:r>
-            <a:endParaRPr sz="1600"/>
-          </a:p>
-          <a:p>
-            <a:pPr indent="-330200" lvl="1" marL="914400" rtl="0" algn="l">
-              <a:spcBef>
-                <a:spcPts val="0"/>
-              </a:spcBef>
-              <a:spcAft>
-                <a:spcPts val="0"/>
-              </a:spcAft>
-              <a:buSzPts val="1600"/>
-              <a:buChar char="○"/>
-            </a:pPr>
-            <a:r>
-              <a:rPr lang="en" sz="1600"/>
-              <a:t>AWS</a:t>
-            </a:r>
-            <a:endParaRPr sz="1600"/>
-          </a:p>
-          <a:p>
-            <a:pPr indent="-330200" lvl="2" marL="1371600" rtl="0" algn="l">
-              <a:spcBef>
-                <a:spcPts val="0"/>
-              </a:spcBef>
-              <a:spcAft>
-                <a:spcPts val="0"/>
-              </a:spcAft>
-              <a:buSzPts val="1600"/>
-              <a:buChar char="■"/>
-            </a:pPr>
-            <a:r>
-              <a:rPr lang="en" sz="1600"/>
-              <a:t>RDS instance for connection to pgadmin</a:t>
-            </a:r>
-            <a:endParaRPr sz="1600"/>
-          </a:p>
-          <a:p>
-            <a:pPr indent="-330200" lvl="2" marL="1371600" rtl="0" algn="l">
-              <a:spcBef>
-                <a:spcPts val="0"/>
-              </a:spcBef>
-              <a:spcAft>
-                <a:spcPts val="0"/>
-              </a:spcAft>
-              <a:buSzPts val="1600"/>
-              <a:buChar char="■"/>
-            </a:pPr>
-            <a:r>
-              <a:rPr lang="en" sz="1600"/>
-              <a:t>S3 buckets</a:t>
-            </a:r>
-            <a:endParaRPr sz="1600"/>
-          </a:p>
-          <a:p>
-            <a:pPr indent="-342900" lvl="0" marL="457200" rtl="0" algn="l">
-              <a:spcBef>
-                <a:spcPts val="0"/>
-              </a:spcBef>
-              <a:spcAft>
-                <a:spcPts val="0"/>
-              </a:spcAft>
-              <a:buSzPts val="1800"/>
-              <a:buChar char="★"/>
-            </a:pPr>
-            <a:r>
-              <a:rPr lang="en" sz="1800"/>
-              <a:t>Machine Learning</a:t>
-            </a:r>
-            <a:endParaRPr sz="1800"/>
-          </a:p>
-          <a:p>
-            <a:pPr indent="-330200" lvl="1" marL="914400" rtl="0" algn="l">
-              <a:spcBef>
-                <a:spcPts val="0"/>
-              </a:spcBef>
-              <a:spcAft>
-                <a:spcPts val="0"/>
-              </a:spcAft>
-              <a:buSzPts val="1600"/>
-              <a:buChar char="○"/>
-            </a:pPr>
-            <a:r>
-              <a:rPr lang="en" sz="1600"/>
-              <a:t>Sci-kit Learn</a:t>
-            </a:r>
-            <a:endParaRPr sz="1600"/>
-          </a:p>
-          <a:p>
-            <a:pPr indent="-342900" lvl="0" marL="457200" rtl="0" algn="l">
-              <a:spcBef>
-                <a:spcPts val="0"/>
-              </a:spcBef>
-              <a:spcAft>
-                <a:spcPts val="0"/>
-              </a:spcAft>
-              <a:buSzPts val="1800"/>
-              <a:buChar char="★"/>
-            </a:pPr>
-            <a:r>
-              <a:rPr lang="en" sz="1800"/>
-              <a:t>Dashboard</a:t>
-            </a:r>
-            <a:endParaRPr sz="1800"/>
-          </a:p>
-          <a:p>
-            <a:pPr indent="-330200" lvl="1" marL="914400" rtl="0" algn="l">
-              <a:spcBef>
-                <a:spcPts val="0"/>
-              </a:spcBef>
-              <a:spcAft>
-                <a:spcPts val="0"/>
-              </a:spcAft>
-              <a:buSzPts val="1600"/>
-              <a:buChar char="○"/>
-            </a:pPr>
-            <a:r>
-              <a:rPr lang="en" sz="1600"/>
-              <a:t>Flask, Tableau, and D3.js</a:t>
+              <a:t>Different demographic groups have different desires</a:t>
             </a:r>
             <a:endParaRPr sz="1600"/>
           </a:p>
@@ -13459,7 +14636,7 @@
         </p:nvSpPr>
         <p:spPr>
           <a:xfrm>
-            <a:off x="594175" y="1246500"/>
+            <a:off x="586775" y="573025"/>
             <a:ext cx="3613500" cy="3172800"/>
           </a:xfrm>
           <a:prstGeom prst="rect">
@@ -13468,11 +14645,11 @@
         </p:spPr>
         <p:txBody>
           <a:bodyPr anchorCtr="0" anchor="t" bIns="91425" lIns="91425" spcFirstLastPara="1" rIns="91425" wrap="square" tIns="91425">
-            <a:normAutofit/>
+            <a:normAutofit fontScale="90000"/>
           </a:bodyPr>
           <a:lstStyle/>
           <a:p>
-            <a:pPr indent="-419100" lvl="0" marL="457200" rtl="0" algn="l">
+            <a:pPr indent="-400050" lvl="0" marL="457200" rtl="0" algn="l">
               <a:spcBef>
                 <a:spcPts val="0"/>
               </a:spcBef>
@@ -13482,7 +14659,7 @@
               <a:buClr>
                 <a:schemeClr val="dk2"/>
               </a:buClr>
-              <a:buSzPts val="3000"/>
+              <a:buSzPct val="100000"/>
               <a:buChar char="★"/>
             </a:pPr>
             <a:r>
@@ -13500,7 +14677,7 @@
             </a:endParaRPr>
           </a:p>
           <a:p>
-            <a:pPr indent="-412750" lvl="1" marL="914400" rtl="0" algn="l">
+            <a:pPr indent="-394335" lvl="1" marL="914400" rtl="0" algn="l">
               <a:spcBef>
                 <a:spcPts val="0"/>
               </a:spcBef>
@@ -13510,7 +14687,7 @@
               <a:buClr>
                 <a:schemeClr val="dk2"/>
               </a:buClr>
-              <a:buSzPts val="2900"/>
+              <a:buSzPct val="100000"/>
               <a:buChar char="○"/>
             </a:pPr>
             <a:r>
@@ -13519,7 +14696,7 @@
                   <a:schemeClr val="dk2"/>
                 </a:solidFill>
               </a:rPr>
-              <a:t>Predicting success of beer-serving businesses</a:t>
+              <a:t>Predicting success of beer-serving businesses; what makes them successful</a:t>
             </a:r>
             <a:endParaRPr sz="2900">
               <a:solidFill>
@@ -13554,7 +14731,7 @@
         </p:nvSpPr>
         <p:spPr>
           <a:xfrm>
-            <a:off x="4293425" y="1246500"/>
+            <a:off x="4200275" y="573025"/>
             <a:ext cx="4204500" cy="3069000"/>
           </a:xfrm>
           <a:prstGeom prst="rect">
@@ -13646,7 +14823,31 @@
                 <a:cs typeface="Nunito"/>
                 <a:sym typeface="Nunito"/>
               </a:rPr>
-              <a:t>ant to discern factors that lead to beer-serving business success</a:t>
+              <a:t>ant to know where to open our beer serving </a:t>
+            </a:r>
+            <a:r>
+              <a:rPr lang="en" sz="2900">
+                <a:solidFill>
+                  <a:schemeClr val="accent2"/>
+                </a:solidFill>
+                <a:latin typeface="Nunito"/>
+                <a:ea typeface="Nunito"/>
+                <a:cs typeface="Nunito"/>
+                <a:sym typeface="Nunito"/>
+              </a:rPr>
+              <a:t>restaurant</a:t>
+            </a:r>
+            <a:r>
+              <a:rPr lang="en" sz="2900">
+                <a:solidFill>
+                  <a:schemeClr val="accent2"/>
+                </a:solidFill>
+                <a:latin typeface="Nunito"/>
+                <a:ea typeface="Nunito"/>
+                <a:cs typeface="Nunito"/>
+                <a:sym typeface="Nunito"/>
+              </a:rPr>
+              <a:t> - The Hermitage</a:t>
             </a:r>
             <a:endParaRPr sz="2900">
               <a:solidFill>
@@ -13695,8 +14896,8 @@
         </p:nvSpPr>
         <p:spPr>
           <a:xfrm>
-            <a:off x="819150" y="845600"/>
-            <a:ext cx="7505700" cy="954600"/>
+            <a:off x="819150" y="781300"/>
+            <a:ext cx="7505700" cy="761700"/>
           </a:xfrm>
           <a:prstGeom prst="rect">
             <a:avLst/>
@@ -13719,7 +14920,7 @@
             </a:pPr>
             <a:r>
               <a:rPr lang="en"/>
-              <a:t>Sources</a:t>
+              <a:t>Future Analysis Recommendations</a:t>
             </a:r>
             <a:endParaRPr/>
           </a:p>
@@ -13728,6 +14929,675 @@
       <p:sp>
         <p:nvSpPr>
           <p:cNvPr id="264" name="Google Shape;264;p32"/>
+          <p:cNvSpPr txBox="1"/>
+          <p:nvPr>
+            <p:ph idx="1" type="body"/>
+          </p:nvPr>
+        </p:nvSpPr>
+        <p:spPr>
+          <a:xfrm>
+            <a:off x="819150" y="1543000"/>
+            <a:ext cx="7505700" cy="2895600"/>
+          </a:xfrm>
+          <a:prstGeom prst="rect">
+            <a:avLst/>
+          </a:prstGeom>
+        </p:spPr>
+        <p:txBody>
+          <a:bodyPr anchorCtr="0" anchor="t" bIns="91425" lIns="91425" spcFirstLastPara="1" rIns="91425" wrap="square" tIns="91425">
+            <a:normAutofit/>
+          </a:bodyPr>
+          <a:lstStyle/>
+          <a:p>
+            <a:pPr indent="-342900" lvl="0" marL="457200" rtl="0" algn="l">
+              <a:spcBef>
+                <a:spcPts val="0"/>
+              </a:spcBef>
+              <a:spcAft>
+                <a:spcPts val="0"/>
+              </a:spcAft>
+              <a:buSzPts val="1800"/>
+              <a:buChar char="★"/>
+            </a:pPr>
+            <a:r>
+              <a:rPr lang="en" sz="1800"/>
+              <a:t>Addition of Review Data (Yelp, Google) to join with the permit data</a:t>
+            </a:r>
+            <a:endParaRPr sz="1800"/>
+          </a:p>
+          <a:p>
+            <a:pPr indent="-342900" lvl="0" marL="457200" rtl="0" algn="l">
+              <a:spcBef>
+                <a:spcPts val="0"/>
+              </a:spcBef>
+              <a:spcAft>
+                <a:spcPts val="0"/>
+              </a:spcAft>
+              <a:buSzPts val="1800"/>
+              <a:buChar char="★"/>
+            </a:pPr>
+            <a:r>
+              <a:rPr lang="en" sz="1800"/>
+              <a:t>Addition of Revenue Data to join with the permit data</a:t>
+            </a:r>
+            <a:endParaRPr sz="1800"/>
+          </a:p>
+        </p:txBody>
+      </p:sp>
+      <p:pic>
+        <p:nvPicPr>
+          <p:cNvPr id="265" name="Google Shape;265;p32"/>
+          <p:cNvPicPr preferRelativeResize="0"/>
+          <p:nvPr/>
+        </p:nvPicPr>
+        <p:blipFill>
+          <a:blip r:embed="rId3">
+            <a:alphaModFix/>
+          </a:blip>
+          <a:stretch>
+            <a:fillRect/>
+          </a:stretch>
+        </p:blipFill>
+        <p:spPr>
+          <a:xfrm>
+            <a:off x="6325775" y="2571750"/>
+            <a:ext cx="2309825" cy="2309825"/>
+          </a:xfrm>
+          <a:prstGeom prst="rect">
+            <a:avLst/>
+          </a:prstGeom>
+          <a:noFill/>
+          <a:ln>
+            <a:noFill/>
+          </a:ln>
+        </p:spPr>
+      </p:pic>
+    </p:spTree>
+  </p:cSld>
+  <p:clrMapOvr>
+    <a:masterClrMapping/>
+  </p:clrMapOvr>
+</p:sld>
+</file>
+
+<file path=ppt/slides/slide21.xml><?xml version="1.0" encoding="utf-8"?>
+<p:sld xmlns:a="http://schemas.openxmlformats.org/drawingml/2006/main" xmlns:r="http://schemas.openxmlformats.org/officeDocument/2006/relationships" xmlns:mc="http://schemas.openxmlformats.org/markup-compatibility/2006" xmlns:mv="urn:schemas-microsoft-com:mac:vml" xmlns:p="http://schemas.openxmlformats.org/presentationml/2006/main" xmlns:c="http://schemas.openxmlformats.org/drawingml/2006/chart" xmlns:dgm="http://schemas.openxmlformats.org/drawingml/2006/diagram" xmlns:o="urn:schemas-microsoft-com:office:office" xmlns:v="urn:schemas-microsoft-com:vml" xmlns:pvml="urn:schemas-microsoft-com:office:powerpoint" xmlns:com="http://schemas.openxmlformats.org/drawingml/2006/compatibility" xmlns:p14="http://schemas.microsoft.com/office/powerpoint/2010/main" xmlns:p15="http://schemas.microsoft.com/office/powerpoint/2012/main" xmlns:ahyp="http://schemas.microsoft.com/office/drawing/2018/hyperlinkcolor">
+  <p:cSld>
+    <p:spTree>
+      <p:nvGrpSpPr>
+        <p:cNvPr id="269" name="Shape 269"/>
+        <p:cNvGrpSpPr/>
+        <p:nvPr/>
+      </p:nvGrpSpPr>
+      <p:grpSpPr>
+        <a:xfrm>
+          <a:off x="0" y="0"/>
+          <a:ext cx="0" cy="0"/>
+          <a:chOff x="0" y="0"/>
+          <a:chExt cx="0" cy="0"/>
+        </a:xfrm>
+      </p:grpSpPr>
+      <p:pic>
+        <p:nvPicPr>
+          <p:cNvPr id="270" name="Google Shape;270;p33"/>
+          <p:cNvPicPr preferRelativeResize="0"/>
+          <p:nvPr/>
+        </p:nvPicPr>
+        <p:blipFill>
+          <a:blip r:embed="rId3">
+            <a:alphaModFix amt="15000"/>
+          </a:blip>
+          <a:stretch>
+            <a:fillRect/>
+          </a:stretch>
+        </p:blipFill>
+        <p:spPr>
+          <a:xfrm>
+            <a:off x="196450" y="446500"/>
+            <a:ext cx="8751101" cy="4375550"/>
+          </a:xfrm>
+          <a:prstGeom prst="rect">
+            <a:avLst/>
+          </a:prstGeom>
+          <a:noFill/>
+          <a:ln>
+            <a:noFill/>
+          </a:ln>
+        </p:spPr>
+      </p:pic>
+      <p:sp>
+        <p:nvSpPr>
+          <p:cNvPr id="271" name="Google Shape;271;p33"/>
+          <p:cNvSpPr txBox="1"/>
+          <p:nvPr>
+            <p:ph type="title"/>
+          </p:nvPr>
+        </p:nvSpPr>
+        <p:spPr>
+          <a:xfrm>
+            <a:off x="819150" y="781300"/>
+            <a:ext cx="7505700" cy="686700"/>
+          </a:xfrm>
+          <a:prstGeom prst="rect">
+            <a:avLst/>
+          </a:prstGeom>
+        </p:spPr>
+        <p:txBody>
+          <a:bodyPr anchorCtr="0" anchor="t" bIns="91425" lIns="91425" spcFirstLastPara="1" rIns="91425" wrap="square" tIns="91425">
+            <a:normAutofit/>
+          </a:bodyPr>
+          <a:lstStyle/>
+          <a:p>
+            <a:pPr indent="0" lvl="0" marL="0" rtl="0" algn="l">
+              <a:spcBef>
+                <a:spcPts val="0"/>
+              </a:spcBef>
+              <a:spcAft>
+                <a:spcPts val="0"/>
+              </a:spcAft>
+              <a:buNone/>
+            </a:pPr>
+            <a:r>
+              <a:rPr lang="en"/>
+              <a:t>Things We Would’ve Done Differently</a:t>
+            </a:r>
+            <a:endParaRPr/>
+          </a:p>
+        </p:txBody>
+      </p:sp>
+      <p:sp>
+        <p:nvSpPr>
+          <p:cNvPr id="272" name="Google Shape;272;p33"/>
+          <p:cNvSpPr txBox="1"/>
+          <p:nvPr>
+            <p:ph idx="1" type="body"/>
+          </p:nvPr>
+        </p:nvSpPr>
+        <p:spPr>
+          <a:xfrm>
+            <a:off x="819150" y="1468000"/>
+            <a:ext cx="7505700" cy="2970600"/>
+          </a:xfrm>
+          <a:prstGeom prst="rect">
+            <a:avLst/>
+          </a:prstGeom>
+        </p:spPr>
+        <p:txBody>
+          <a:bodyPr anchorCtr="0" anchor="t" bIns="91425" lIns="91425" spcFirstLastPara="1" rIns="91425" wrap="square" tIns="91425">
+            <a:normAutofit/>
+          </a:bodyPr>
+          <a:lstStyle/>
+          <a:p>
+            <a:pPr indent="-342900" lvl="0" marL="457200" rtl="0" algn="l">
+              <a:spcBef>
+                <a:spcPts val="0"/>
+              </a:spcBef>
+              <a:spcAft>
+                <a:spcPts val="0"/>
+              </a:spcAft>
+              <a:buSzPts val="1800"/>
+              <a:buChar char="★"/>
+            </a:pPr>
+            <a:r>
+              <a:rPr lang="en" sz="1800"/>
+              <a:t>Rent data by zip code</a:t>
+            </a:r>
+            <a:endParaRPr sz="1800"/>
+          </a:p>
+          <a:p>
+            <a:pPr indent="-342900" lvl="0" marL="457200" rtl="0" algn="l">
+              <a:spcBef>
+                <a:spcPts val="0"/>
+              </a:spcBef>
+              <a:spcAft>
+                <a:spcPts val="0"/>
+              </a:spcAft>
+              <a:buSzPts val="1800"/>
+              <a:buChar char="★"/>
+            </a:pPr>
+            <a:r>
+              <a:rPr lang="en" sz="1800">
+                <a:solidFill>
+                  <a:srgbClr val="000000"/>
+                </a:solidFill>
+              </a:rPr>
+              <a:t>Map hotel and short term rentals</a:t>
+            </a:r>
+            <a:r>
+              <a:rPr lang="en" sz="1800"/>
+              <a:t> </a:t>
+            </a:r>
+            <a:endParaRPr sz="1800"/>
+          </a:p>
+          <a:p>
+            <a:pPr indent="-342900" lvl="0" marL="457200" rtl="0" algn="l">
+              <a:spcBef>
+                <a:spcPts val="0"/>
+              </a:spcBef>
+              <a:spcAft>
+                <a:spcPts val="0"/>
+              </a:spcAft>
+              <a:buSzPts val="1800"/>
+              <a:buChar char="★"/>
+            </a:pPr>
+            <a:r>
+              <a:rPr lang="en" sz="1800"/>
+              <a:t>Experimented</a:t>
+            </a:r>
+            <a:r>
+              <a:rPr lang="en" sz="1800"/>
+              <a:t> with additional machine learning models</a:t>
+            </a:r>
+            <a:endParaRPr sz="1800"/>
+          </a:p>
+        </p:txBody>
+      </p:sp>
+    </p:spTree>
+  </p:cSld>
+  <p:clrMapOvr>
+    <a:masterClrMapping/>
+  </p:clrMapOvr>
+</p:sld>
+</file>
+
+<file path=ppt/slides/slide22.xml><?xml version="1.0" encoding="utf-8"?>
+<p:sld xmlns:a="http://schemas.openxmlformats.org/drawingml/2006/main" xmlns:r="http://schemas.openxmlformats.org/officeDocument/2006/relationships" xmlns:mc="http://schemas.openxmlformats.org/markup-compatibility/2006" xmlns:mv="urn:schemas-microsoft-com:mac:vml" xmlns:p="http://schemas.openxmlformats.org/presentationml/2006/main" xmlns:c="http://schemas.openxmlformats.org/drawingml/2006/chart" xmlns:dgm="http://schemas.openxmlformats.org/drawingml/2006/diagram" xmlns:o="urn:schemas-microsoft-com:office:office" xmlns:v="urn:schemas-microsoft-com:vml" xmlns:pvml="urn:schemas-microsoft-com:office:powerpoint" xmlns:com="http://schemas.openxmlformats.org/drawingml/2006/compatibility" xmlns:p14="http://schemas.microsoft.com/office/powerpoint/2010/main" xmlns:p15="http://schemas.microsoft.com/office/powerpoint/2012/main" xmlns:ahyp="http://schemas.microsoft.com/office/drawing/2018/hyperlinkcolor">
+  <p:cSld>
+    <p:spTree>
+      <p:nvGrpSpPr>
+        <p:cNvPr id="276" name="Shape 276"/>
+        <p:cNvGrpSpPr/>
+        <p:nvPr/>
+      </p:nvGrpSpPr>
+      <p:grpSpPr>
+        <a:xfrm>
+          <a:off x="0" y="0"/>
+          <a:ext cx="0" cy="0"/>
+          <a:chOff x="0" y="0"/>
+          <a:chExt cx="0" cy="0"/>
+        </a:xfrm>
+      </p:grpSpPr>
+      <p:pic>
+        <p:nvPicPr>
+          <p:cNvPr id="277" name="Google Shape;277;p34"/>
+          <p:cNvPicPr preferRelativeResize="0"/>
+          <p:nvPr/>
+        </p:nvPicPr>
+        <p:blipFill>
+          <a:blip r:embed="rId3">
+            <a:alphaModFix amt="20000"/>
+          </a:blip>
+          <a:stretch>
+            <a:fillRect/>
+          </a:stretch>
+        </p:blipFill>
+        <p:spPr>
+          <a:xfrm>
+            <a:off x="196350" y="203600"/>
+            <a:ext cx="8751199" cy="4753450"/>
+          </a:xfrm>
+          <a:prstGeom prst="rect">
+            <a:avLst/>
+          </a:prstGeom>
+          <a:noFill/>
+          <a:ln>
+            <a:noFill/>
+          </a:ln>
+        </p:spPr>
+      </p:pic>
+      <p:sp>
+        <p:nvSpPr>
+          <p:cNvPr id="278" name="Google Shape;278;p34"/>
+          <p:cNvSpPr txBox="1"/>
+          <p:nvPr>
+            <p:ph type="title"/>
+          </p:nvPr>
+        </p:nvSpPr>
+        <p:spPr>
+          <a:xfrm>
+            <a:off x="819150" y="312050"/>
+            <a:ext cx="7505700" cy="680400"/>
+          </a:xfrm>
+          <a:prstGeom prst="rect">
+            <a:avLst/>
+          </a:prstGeom>
+        </p:spPr>
+        <p:txBody>
+          <a:bodyPr anchorCtr="0" anchor="t" bIns="91425" lIns="91425" spcFirstLastPara="1" rIns="91425" wrap="square" tIns="91425">
+            <a:normAutofit/>
+          </a:bodyPr>
+          <a:lstStyle/>
+          <a:p>
+            <a:pPr indent="0" lvl="0" marL="0" rtl="0" algn="l">
+              <a:spcBef>
+                <a:spcPts val="0"/>
+              </a:spcBef>
+              <a:spcAft>
+                <a:spcPts val="0"/>
+              </a:spcAft>
+              <a:buNone/>
+            </a:pPr>
+            <a:r>
+              <a:rPr lang="en"/>
+              <a:t>Technologies Used</a:t>
+            </a:r>
+            <a:endParaRPr/>
+          </a:p>
+        </p:txBody>
+      </p:sp>
+      <p:sp>
+        <p:nvSpPr>
+          <p:cNvPr id="279" name="Google Shape;279;p34"/>
+          <p:cNvSpPr txBox="1"/>
+          <p:nvPr>
+            <p:ph idx="1" type="body"/>
+          </p:nvPr>
+        </p:nvSpPr>
+        <p:spPr>
+          <a:xfrm>
+            <a:off x="819150" y="992450"/>
+            <a:ext cx="7505700" cy="3788100"/>
+          </a:xfrm>
+          <a:prstGeom prst="rect">
+            <a:avLst/>
+          </a:prstGeom>
+        </p:spPr>
+        <p:txBody>
+          <a:bodyPr anchorCtr="0" anchor="t" bIns="91425" lIns="91425" spcFirstLastPara="1" rIns="91425" wrap="square" tIns="91425">
+            <a:normAutofit lnSpcReduction="10000"/>
+          </a:bodyPr>
+          <a:lstStyle/>
+          <a:p>
+            <a:pPr indent="-342900" lvl="0" marL="457200" rtl="0" algn="l">
+              <a:spcBef>
+                <a:spcPts val="0"/>
+              </a:spcBef>
+              <a:spcAft>
+                <a:spcPts val="0"/>
+              </a:spcAft>
+              <a:buSzPts val="1800"/>
+              <a:buChar char="★"/>
+            </a:pPr>
+            <a:r>
+              <a:rPr lang="en" sz="1800"/>
+              <a:t>Data cleaning and analysis:</a:t>
+            </a:r>
+            <a:endParaRPr sz="1800"/>
+          </a:p>
+          <a:p>
+            <a:pPr indent="-330200" lvl="1" marL="914400" rtl="0" algn="l">
+              <a:spcBef>
+                <a:spcPts val="0"/>
+              </a:spcBef>
+              <a:spcAft>
+                <a:spcPts val="0"/>
+              </a:spcAft>
+              <a:buSzPts val="1600"/>
+              <a:buChar char="○"/>
+            </a:pPr>
+            <a:r>
+              <a:rPr lang="en" sz="1600"/>
+              <a:t>Pandas for cleaning and transforming data and exploratory analysis</a:t>
+            </a:r>
+            <a:endParaRPr sz="1600"/>
+          </a:p>
+          <a:p>
+            <a:pPr indent="-330200" lvl="1" marL="914400" rtl="0" algn="l">
+              <a:spcBef>
+                <a:spcPts val="0"/>
+              </a:spcBef>
+              <a:spcAft>
+                <a:spcPts val="0"/>
+              </a:spcAft>
+              <a:buSzPts val="1600"/>
+              <a:buChar char="○"/>
+            </a:pPr>
+            <a:r>
+              <a:rPr lang="en" sz="1600"/>
+              <a:t>Python for further analysis</a:t>
+            </a:r>
+            <a:endParaRPr sz="1600"/>
+          </a:p>
+          <a:p>
+            <a:pPr indent="-342900" lvl="0" marL="457200" rtl="0" algn="l">
+              <a:spcBef>
+                <a:spcPts val="0"/>
+              </a:spcBef>
+              <a:spcAft>
+                <a:spcPts val="0"/>
+              </a:spcAft>
+              <a:buSzPts val="1800"/>
+              <a:buChar char="★"/>
+            </a:pPr>
+            <a:r>
+              <a:rPr lang="en" sz="1800"/>
+              <a:t>Database storage</a:t>
+            </a:r>
+            <a:endParaRPr sz="1800"/>
+          </a:p>
+          <a:p>
+            <a:pPr indent="-330200" lvl="1" marL="914400" rtl="0" algn="l">
+              <a:spcBef>
+                <a:spcPts val="0"/>
+              </a:spcBef>
+              <a:spcAft>
+                <a:spcPts val="0"/>
+              </a:spcAft>
+              <a:buSzPts val="1600"/>
+              <a:buChar char="○"/>
+            </a:pPr>
+            <a:r>
+              <a:rPr lang="en" sz="1600"/>
+              <a:t>Postgres</a:t>
+            </a:r>
+            <a:endParaRPr sz="1600"/>
+          </a:p>
+          <a:p>
+            <a:pPr indent="-330200" lvl="2" marL="1371600" rtl="0" algn="l">
+              <a:spcBef>
+                <a:spcPts val="0"/>
+              </a:spcBef>
+              <a:spcAft>
+                <a:spcPts val="0"/>
+              </a:spcAft>
+              <a:buSzPts val="1600"/>
+              <a:buChar char="■"/>
+            </a:pPr>
+            <a:r>
+              <a:rPr lang="en" sz="1600"/>
+              <a:t>Flask for data display</a:t>
+            </a:r>
+            <a:endParaRPr sz="1600"/>
+          </a:p>
+          <a:p>
+            <a:pPr indent="-330200" lvl="1" marL="914400" rtl="0" algn="l">
+              <a:spcBef>
+                <a:spcPts val="0"/>
+              </a:spcBef>
+              <a:spcAft>
+                <a:spcPts val="0"/>
+              </a:spcAft>
+              <a:buSzPts val="1600"/>
+              <a:buChar char="○"/>
+            </a:pPr>
+            <a:r>
+              <a:rPr lang="en" sz="1600"/>
+              <a:t>AWS</a:t>
+            </a:r>
+            <a:endParaRPr sz="1600"/>
+          </a:p>
+          <a:p>
+            <a:pPr indent="-330200" lvl="2" marL="1371600" rtl="0" algn="l">
+              <a:spcBef>
+                <a:spcPts val="0"/>
+              </a:spcBef>
+              <a:spcAft>
+                <a:spcPts val="0"/>
+              </a:spcAft>
+              <a:buSzPts val="1600"/>
+              <a:buChar char="■"/>
+            </a:pPr>
+            <a:r>
+              <a:rPr lang="en" sz="1600"/>
+              <a:t>RDS instance for connection to pgadmin</a:t>
+            </a:r>
+            <a:endParaRPr sz="1600"/>
+          </a:p>
+          <a:p>
+            <a:pPr indent="-330200" lvl="2" marL="1371600" rtl="0" algn="l">
+              <a:spcBef>
+                <a:spcPts val="0"/>
+              </a:spcBef>
+              <a:spcAft>
+                <a:spcPts val="0"/>
+              </a:spcAft>
+              <a:buSzPts val="1600"/>
+              <a:buChar char="■"/>
+            </a:pPr>
+            <a:r>
+              <a:rPr lang="en" sz="1600"/>
+              <a:t>S3 buckets</a:t>
+            </a:r>
+            <a:endParaRPr sz="1600"/>
+          </a:p>
+          <a:p>
+            <a:pPr indent="-342900" lvl="0" marL="457200" rtl="0" algn="l">
+              <a:spcBef>
+                <a:spcPts val="0"/>
+              </a:spcBef>
+              <a:spcAft>
+                <a:spcPts val="0"/>
+              </a:spcAft>
+              <a:buSzPts val="1800"/>
+              <a:buChar char="★"/>
+            </a:pPr>
+            <a:r>
+              <a:rPr lang="en" sz="1800"/>
+              <a:t>Machine Learning</a:t>
+            </a:r>
+            <a:endParaRPr sz="1800"/>
+          </a:p>
+          <a:p>
+            <a:pPr indent="-330200" lvl="1" marL="914400" rtl="0" algn="l">
+              <a:spcBef>
+                <a:spcPts val="0"/>
+              </a:spcBef>
+              <a:spcAft>
+                <a:spcPts val="0"/>
+              </a:spcAft>
+              <a:buSzPts val="1600"/>
+              <a:buChar char="○"/>
+            </a:pPr>
+            <a:r>
+              <a:rPr lang="en" sz="1600"/>
+              <a:t>Sci-kit Learn</a:t>
+            </a:r>
+            <a:endParaRPr sz="1600"/>
+          </a:p>
+          <a:p>
+            <a:pPr indent="-342900" lvl="0" marL="457200" rtl="0" algn="l">
+              <a:spcBef>
+                <a:spcPts val="0"/>
+              </a:spcBef>
+              <a:spcAft>
+                <a:spcPts val="0"/>
+              </a:spcAft>
+              <a:buSzPts val="1800"/>
+              <a:buChar char="★"/>
+            </a:pPr>
+            <a:r>
+              <a:rPr lang="en" sz="1800"/>
+              <a:t>Dashboard</a:t>
+            </a:r>
+            <a:endParaRPr sz="1800"/>
+          </a:p>
+          <a:p>
+            <a:pPr indent="-330200" lvl="1" marL="914400" rtl="0" algn="l">
+              <a:spcBef>
+                <a:spcPts val="0"/>
+              </a:spcBef>
+              <a:spcAft>
+                <a:spcPts val="0"/>
+              </a:spcAft>
+              <a:buSzPts val="1600"/>
+              <a:buChar char="○"/>
+            </a:pPr>
+            <a:r>
+              <a:rPr lang="en" sz="1600"/>
+              <a:t> Tableau</a:t>
+            </a:r>
+            <a:endParaRPr sz="1600"/>
+          </a:p>
+        </p:txBody>
+      </p:sp>
+    </p:spTree>
+  </p:cSld>
+  <p:clrMapOvr>
+    <a:masterClrMapping/>
+  </p:clrMapOvr>
+</p:sld>
+</file>
+
+<file path=ppt/slides/slide23.xml><?xml version="1.0" encoding="utf-8"?>
+<p:sld xmlns:a="http://schemas.openxmlformats.org/drawingml/2006/main" xmlns:r="http://schemas.openxmlformats.org/officeDocument/2006/relationships" xmlns:mc="http://schemas.openxmlformats.org/markup-compatibility/2006" xmlns:mv="urn:schemas-microsoft-com:mac:vml" xmlns:p="http://schemas.openxmlformats.org/presentationml/2006/main" xmlns:c="http://schemas.openxmlformats.org/drawingml/2006/chart" xmlns:dgm="http://schemas.openxmlformats.org/drawingml/2006/diagram" xmlns:o="urn:schemas-microsoft-com:office:office" xmlns:v="urn:schemas-microsoft-com:vml" xmlns:pvml="urn:schemas-microsoft-com:office:powerpoint" xmlns:com="http://schemas.openxmlformats.org/drawingml/2006/compatibility" xmlns:p14="http://schemas.microsoft.com/office/powerpoint/2010/main" xmlns:p15="http://schemas.microsoft.com/office/powerpoint/2012/main" xmlns:ahyp="http://schemas.microsoft.com/office/drawing/2018/hyperlinkcolor">
+  <p:cSld>
+    <p:spTree>
+      <p:nvGrpSpPr>
+        <p:cNvPr id="283" name="Shape 283"/>
+        <p:cNvGrpSpPr/>
+        <p:nvPr/>
+      </p:nvGrpSpPr>
+      <p:grpSpPr>
+        <a:xfrm>
+          <a:off x="0" y="0"/>
+          <a:ext cx="0" cy="0"/>
+          <a:chOff x="0" y="0"/>
+          <a:chExt cx="0" cy="0"/>
+        </a:xfrm>
+      </p:grpSpPr>
+      <p:sp>
+        <p:nvSpPr>
+          <p:cNvPr id="284" name="Google Shape;284;p35"/>
+          <p:cNvSpPr txBox="1"/>
+          <p:nvPr>
+            <p:ph type="title"/>
+          </p:nvPr>
+        </p:nvSpPr>
+        <p:spPr>
+          <a:xfrm>
+            <a:off x="819150" y="845600"/>
+            <a:ext cx="7505700" cy="954600"/>
+          </a:xfrm>
+          <a:prstGeom prst="rect">
+            <a:avLst/>
+          </a:prstGeom>
+        </p:spPr>
+        <p:txBody>
+          <a:bodyPr anchorCtr="0" anchor="t" bIns="91425" lIns="91425" spcFirstLastPara="1" rIns="91425" wrap="square" tIns="91425">
+            <a:normAutofit/>
+          </a:bodyPr>
+          <a:lstStyle/>
+          <a:p>
+            <a:pPr indent="0" lvl="0" marL="0" rtl="0" algn="l">
+              <a:spcBef>
+                <a:spcPts val="0"/>
+              </a:spcBef>
+              <a:spcAft>
+                <a:spcPts val="0"/>
+              </a:spcAft>
+              <a:buNone/>
+            </a:pPr>
+            <a:r>
+              <a:rPr lang="en"/>
+              <a:t>Sources</a:t>
+            </a:r>
+            <a:endParaRPr/>
+          </a:p>
+        </p:txBody>
+      </p:sp>
+      <p:sp>
+        <p:nvSpPr>
+          <p:cNvPr id="285" name="Google Shape;285;p35"/>
           <p:cNvSpPr txBox="1"/>
           <p:nvPr>
             <p:ph idx="1" type="body"/>
@@ -13900,7 +15770,7 @@
         </p:nvPicPr>
         <p:blipFill>
           <a:blip r:embed="rId3">
-            <a:alphaModFix amt="17000"/>
+            <a:alphaModFix amt="20000"/>
           </a:blip>
           <a:stretch>
             <a:fillRect/>
@@ -14151,7 +16021,7 @@
         </p:nvSpPr>
         <p:spPr>
           <a:xfrm>
-            <a:off x="819150" y="514625"/>
+            <a:off x="819138" y="522050"/>
             <a:ext cx="7505700" cy="733200"/>
           </a:xfrm>
           <a:prstGeom prst="rect">
@@ -14175,7 +16045,7 @@
             </a:pPr>
             <a:r>
               <a:rPr lang="en"/>
-              <a:t>Variables of Interest</a:t>
+              <a:t>Variables of Interest - Beer Permit Data</a:t>
             </a:r>
             <a:endParaRPr/>
           </a:p>
@@ -15106,7 +16976,7 @@
         </p:nvPicPr>
         <p:blipFill>
           <a:blip r:embed="rId3">
-            <a:alphaModFix amt="25000"/>
+            <a:alphaModFix amt="20000"/>
           </a:blip>
           <a:stretch>
             <a:fillRect/>
@@ -15201,7 +17071,7 @@
             </a:pPr>
             <a:r>
               <a:rPr lang="en" sz="1800"/>
-              <a:t>Based off of Beer Permit and demographic data, in which zip code will one be more successful when opening a beer serving establishment in Davidson County? </a:t>
+              <a:t>Based off of beer permit and demographic data, in which zip code will one be more successful when opening a beer serving establishment in Davidson County? </a:t>
             </a:r>
             <a:endParaRPr sz="1800"/>
           </a:p>
@@ -15296,6 +17166,285 @@
 </file>
 
 <file path=ppt/theme/theme1.xml><?xml version="1.0" encoding="utf-8"?>
+<a:theme xmlns:a="http://schemas.openxmlformats.org/drawingml/2006/main" xmlns:r="http://schemas.openxmlformats.org/officeDocument/2006/relationships">
+  <a:themeElements>
+    <a:clrScheme name="Default">
+      <a:dk1>
+        <a:srgbClr val="000000"/>
+      </a:dk1>
+      <a:lt1>
+        <a:srgbClr val="FFFFFF"/>
+      </a:lt1>
+      <a:dk2>
+        <a:srgbClr val="158158"/>
+      </a:dk2>
+      <a:lt2>
+        <a:srgbClr val="F3F3F3"/>
+      </a:lt2>
+      <a:accent1>
+        <a:srgbClr val="058DC7"/>
+      </a:accent1>
+      <a:accent2>
+        <a:srgbClr val="50B432"/>
+      </a:accent2>
+      <a:accent3>
+        <a:srgbClr val="ED561B"/>
+      </a:accent3>
+      <a:accent4>
+        <a:srgbClr val="EDEF00"/>
+      </a:accent4>
+      <a:accent5>
+        <a:srgbClr val="24CBE5"/>
+      </a:accent5>
+      <a:accent6>
+        <a:srgbClr val="64E572"/>
+      </a:accent6>
+      <a:hlink>
+        <a:srgbClr val="2200CC"/>
+      </a:hlink>
+      <a:folHlink>
+        <a:srgbClr val="551A8B"/>
+      </a:folHlink>
+    </a:clrScheme>
+    <a:fontScheme name="Office">
+      <a:majorFont>
+        <a:latin typeface="Arial"/>
+        <a:ea typeface=""/>
+        <a:cs typeface=""/>
+        <a:font script="Jpan" typeface="ＭＳ Ｐゴシック"/>
+        <a:font script="Hang" typeface="맑은 고딕"/>
+        <a:font script="Hans" typeface="宋体"/>
+        <a:font script="Hant" typeface="新細明體"/>
+        <a:font script="Arab" typeface="Times New Roman"/>
+        <a:font script="Hebr" typeface="Times New Roman"/>
+        <a:font script="Thai" typeface="Angsana New"/>
+        <a:font script="Ethi" typeface="Nyala"/>
+        <a:font script="Beng" typeface="Vrinda"/>
+        <a:font script="Gujr" typeface="Shruti"/>
+        <a:font script="Khmr" typeface="MoolBoran"/>
+        <a:font script="Knda" typeface="Tunga"/>
+        <a:font script="Guru" typeface="Raavi"/>
+        <a:font script="Cans" typeface="Euphemia"/>
+        <a:font script="Cher" typeface="Plantagenet Cherokee"/>
+        <a:font script="Yiii" typeface="Microsoft Yi Baiti"/>
+        <a:font script="Tibt" typeface="Microsoft Himalaya"/>
+        <a:font script="Thaa" typeface="MV Boli"/>
+        <a:font script="Deva" typeface="Mangal"/>
+        <a:font script="Telu" typeface="Gautami"/>
+        <a:font script="Taml" typeface="Latha"/>
+        <a:font script="Syrc" typeface="Estrangelo Edessa"/>
+        <a:font script="Orya" typeface="Kalinga"/>
+        <a:font script="Mlym" typeface="Kartika"/>
+        <a:font script="Laoo" typeface="DokChampa"/>
+        <a:font script="Sinh" typeface="Iskoola Pota"/>
+        <a:font script="Mong" typeface="Mongolian Baiti"/>
+        <a:font script="Viet" typeface="Times New Roman"/>
+        <a:font script="Uigh" typeface="Microsoft Uighur"/>
+        <a:font script="Geor" typeface="Sylfaen"/>
+      </a:majorFont>
+      <a:minorFont>
+        <a:latin typeface="Arial"/>
+        <a:ea typeface=""/>
+        <a:cs typeface=""/>
+        <a:font script="Jpan" typeface="ＭＳ Ｐゴシック"/>
+        <a:font script="Hang" typeface="맑은 고딕"/>
+        <a:font script="Hans" typeface="宋体"/>
+        <a:font script="Hant" typeface="新細明體"/>
+        <a:font script="Arab" typeface="Arial"/>
+        <a:font script="Hebr" typeface="Arial"/>
+        <a:font script="Thai" typeface="Cordia New"/>
+        <a:font script="Ethi" typeface="Nyala"/>
+        <a:font script="Beng" typeface="Vrinda"/>
+        <a:font script="Gujr" typeface="Shruti"/>
+        <a:font script="Khmr" typeface="DaunPenh"/>
+        <a:font script="Knda" typeface="Tunga"/>
+        <a:font script="Guru" typeface="Raavi"/>
+        <a:font script="Cans" typeface="Euphemia"/>
+        <a:font script="Cher" typeface="Plantagenet Cherokee"/>
+        <a:font script="Yiii" typeface="Microsoft Yi Baiti"/>
+        <a:font script="Tibt" typeface="Microsoft Himalaya"/>
+        <a:font script="Thaa" typeface="MV Boli"/>
+        <a:font script="Deva" typeface="Mangal"/>
+        <a:font script="Telu" typeface="Gautami"/>
+        <a:font script="Taml" typeface="Latha"/>
+        <a:font script="Syrc" typeface="Estrangelo Edessa"/>
+        <a:font script="Orya" typeface="Kalinga"/>
+        <a:font script="Mlym" typeface="Kartika"/>
+        <a:font script="Laoo" typeface="DokChampa"/>
+        <a:font script="Sinh" typeface="Iskoola Pota"/>
+        <a:font script="Mong" typeface="Mongolian Baiti"/>
+        <a:font script="Viet" typeface="Arial"/>
+        <a:font script="Uigh" typeface="Microsoft Uighur"/>
+        <a:font script="Geor" typeface="Sylfaen"/>
+      </a:minorFont>
+    </a:fontScheme>
+    <a:fmtScheme name="Office">
+      <a:fillStyleLst>
+        <a:solidFill>
+          <a:schemeClr val="phClr"/>
+        </a:solidFill>
+        <a:gradFill rotWithShape="1">
+          <a:gsLst>
+            <a:gs pos="0">
+              <a:schemeClr val="phClr">
+                <a:tint val="50000"/>
+                <a:satMod val="300000"/>
+              </a:schemeClr>
+            </a:gs>
+            <a:gs pos="35000">
+              <a:schemeClr val="phClr">
+                <a:tint val="37000"/>
+                <a:satMod val="300000"/>
+              </a:schemeClr>
+            </a:gs>
+            <a:gs pos="100000">
+              <a:schemeClr val="phClr">
+                <a:tint val="15000"/>
+                <a:satMod val="350000"/>
+              </a:schemeClr>
+            </a:gs>
+          </a:gsLst>
+          <a:lin ang="16200000" scaled="1"/>
+        </a:gradFill>
+        <a:gradFill rotWithShape="1">
+          <a:gsLst>
+            <a:gs pos="0">
+              <a:schemeClr val="phClr">
+                <a:tint val="100000"/>
+                <a:shade val="100000"/>
+                <a:satMod val="130000"/>
+              </a:schemeClr>
+            </a:gs>
+            <a:gs pos="100000">
+              <a:schemeClr val="phClr">
+                <a:tint val="50000"/>
+                <a:shade val="100000"/>
+                <a:satMod val="350000"/>
+              </a:schemeClr>
+            </a:gs>
+          </a:gsLst>
+          <a:lin ang="16200000" scaled="0"/>
+        </a:gradFill>
+      </a:fillStyleLst>
+      <a:lnStyleLst>
+        <a:ln w="9525" cap="flat" cmpd="sng" algn="ctr">
+          <a:solidFill>
+            <a:schemeClr val="phClr">
+              <a:shade val="95000"/>
+              <a:satMod val="105000"/>
+            </a:schemeClr>
+          </a:solidFill>
+          <a:prstDash val="solid"/>
+        </a:ln>
+        <a:ln w="25400" cap="flat" cmpd="sng" algn="ctr">
+          <a:solidFill>
+            <a:schemeClr val="phClr"/>
+          </a:solidFill>
+          <a:prstDash val="solid"/>
+        </a:ln>
+        <a:ln w="38100" cap="flat" cmpd="sng" algn="ctr">
+          <a:solidFill>
+            <a:schemeClr val="phClr"/>
+          </a:solidFill>
+          <a:prstDash val="solid"/>
+        </a:ln>
+      </a:lnStyleLst>
+      <a:effectStyleLst>
+        <a:effectStyle>
+          <a:effectLst>
+            <a:outerShdw blurRad="40000" dist="20000" dir="5400000" rotWithShape="0">
+              <a:srgbClr val="000000">
+                <a:alpha val="38000"/>
+              </a:srgbClr>
+            </a:outerShdw>
+          </a:effectLst>
+        </a:effectStyle>
+        <a:effectStyle>
+          <a:effectLst>
+            <a:outerShdw blurRad="40000" dist="23000" dir="5400000" rotWithShape="0">
+              <a:srgbClr val="000000">
+                <a:alpha val="35000"/>
+              </a:srgbClr>
+            </a:outerShdw>
+          </a:effectLst>
+        </a:effectStyle>
+        <a:effectStyle>
+          <a:effectLst>
+            <a:outerShdw blurRad="40000" dist="23000" dir="5400000" rotWithShape="0">
+              <a:srgbClr val="000000">
+                <a:alpha val="35000"/>
+              </a:srgbClr>
+            </a:outerShdw>
+          </a:effectLst>
+          <a:scene3d>
+            <a:camera prst="orthographicFront">
+              <a:rot lat="0" lon="0" rev="0"/>
+            </a:camera>
+            <a:lightRig rig="threePt" dir="t">
+              <a:rot lat="0" lon="0" rev="1200000"/>
+            </a:lightRig>
+          </a:scene3d>
+          <a:sp3d>
+            <a:bevelT w="63500" h="25400"/>
+          </a:sp3d>
+        </a:effectStyle>
+      </a:effectStyleLst>
+      <a:bgFillStyleLst>
+        <a:solidFill>
+          <a:schemeClr val="phClr"/>
+        </a:solidFill>
+        <a:gradFill rotWithShape="1">
+          <a:gsLst>
+            <a:gs pos="0">
+              <a:schemeClr val="phClr">
+                <a:tint val="40000"/>
+                <a:satMod val="350000"/>
+              </a:schemeClr>
+            </a:gs>
+            <a:gs pos="40000">
+              <a:schemeClr val="phClr">
+                <a:tint val="45000"/>
+                <a:shade val="99000"/>
+                <a:satMod val="350000"/>
+              </a:schemeClr>
+            </a:gs>
+            <a:gs pos="100000">
+              <a:schemeClr val="phClr">
+                <a:shade val="20000"/>
+                <a:satMod val="255000"/>
+              </a:schemeClr>
+            </a:gs>
+          </a:gsLst>
+          <a:path path="circle">
+            <a:fillToRect l="50000" t="-80000" r="50000" b="180000"/>
+          </a:path>
+        </a:gradFill>
+        <a:gradFill rotWithShape="1">
+          <a:gsLst>
+            <a:gs pos="0">
+              <a:schemeClr val="phClr">
+                <a:tint val="80000"/>
+                <a:satMod val="300000"/>
+              </a:schemeClr>
+            </a:gs>
+            <a:gs pos="100000">
+              <a:schemeClr val="phClr">
+                <a:shade val="30000"/>
+                <a:satMod val="200000"/>
+              </a:schemeClr>
+            </a:gs>
+          </a:gsLst>
+          <a:path path="circle">
+            <a:fillToRect l="50000" t="50000" r="50000" b="50000"/>
+          </a:path>
+        </a:gradFill>
+      </a:bgFillStyleLst>
+    </a:fmtScheme>
+  </a:themeElements>
+</a:theme>
+</file>
+
+<file path=ppt/theme/theme2.xml><?xml version="1.0" encoding="utf-8"?>
 <a:theme xmlns:a="http://schemas.openxmlformats.org/drawingml/2006/main" xmlns:r="http://schemas.openxmlformats.org/officeDocument/2006/relationships" name="Shift">
   <a:themeElements>
     <a:clrScheme name="Shift">
@@ -15572,283 +17721,4 @@
     </a:fmtScheme>
   </a:themeElements>
 </a:theme>
-</file>
-
-<file path=ppt/theme/theme2.xml><?xml version="1.0" encoding="utf-8"?>
-<a:theme xmlns:a="http://schemas.openxmlformats.org/drawingml/2006/main" xmlns:r="http://schemas.openxmlformats.org/officeDocument/2006/relationships">
-  <a:themeElements>
-    <a:clrScheme name="Default">
-      <a:dk1>
-        <a:srgbClr val="000000"/>
-      </a:dk1>
-      <a:lt1>
-        <a:srgbClr val="FFFFFF"/>
-      </a:lt1>
-      <a:dk2>
-        <a:srgbClr val="158158"/>
-      </a:dk2>
-      <a:lt2>
-        <a:srgbClr val="F3F3F3"/>
-      </a:lt2>
-      <a:accent1>
-        <a:srgbClr val="058DC7"/>
-      </a:accent1>
-      <a:accent2>
-        <a:srgbClr val="50B432"/>
-      </a:accent2>
-      <a:accent3>
-        <a:srgbClr val="ED561B"/>
-      </a:accent3>
-      <a:accent4>
-        <a:srgbClr val="EDEF00"/>
-      </a:accent4>
-      <a:accent5>
-        <a:srgbClr val="24CBE5"/>
-      </a:accent5>
-      <a:accent6>
-        <a:srgbClr val="64E572"/>
-      </a:accent6>
-      <a:hlink>
-        <a:srgbClr val="2200CC"/>
-      </a:hlink>
-      <a:folHlink>
-        <a:srgbClr val="551A8B"/>
-      </a:folHlink>
-    </a:clrScheme>
-    <a:fontScheme name="Office">
-      <a:majorFont>
-        <a:latin typeface="Arial"/>
-        <a:ea typeface=""/>
-        <a:cs typeface=""/>
-        <a:font script="Jpan" typeface="ＭＳ Ｐゴシック"/>
-        <a:font script="Hang" typeface="맑은 고딕"/>
-        <a:font script="Hans" typeface="宋体"/>
-        <a:font script="Hant" typeface="新細明體"/>
-        <a:font script="Arab" typeface="Times New Roman"/>
-        <a:font script="Hebr" typeface="Times New Roman"/>
-        <a:font script="Thai" typeface="Angsana New"/>
-        <a:font script="Ethi" typeface="Nyala"/>
-        <a:font script="Beng" typeface="Vrinda"/>
-        <a:font script="Gujr" typeface="Shruti"/>
-        <a:font script="Khmr" typeface="MoolBoran"/>
-        <a:font script="Knda" typeface="Tunga"/>
-        <a:font script="Guru" typeface="Raavi"/>
-        <a:font script="Cans" typeface="Euphemia"/>
-        <a:font script="Cher" typeface="Plantagenet Cherokee"/>
-        <a:font script="Yiii" typeface="Microsoft Yi Baiti"/>
-        <a:font script="Tibt" typeface="Microsoft Himalaya"/>
-        <a:font script="Thaa" typeface="MV Boli"/>
-        <a:font script="Deva" typeface="Mangal"/>
-        <a:font script="Telu" typeface="Gautami"/>
-        <a:font script="Taml" typeface="Latha"/>
-        <a:font script="Syrc" typeface="Estrangelo Edessa"/>
-        <a:font script="Orya" typeface="Kalinga"/>
-        <a:font script="Mlym" typeface="Kartika"/>
-        <a:font script="Laoo" typeface="DokChampa"/>
-        <a:font script="Sinh" typeface="Iskoola Pota"/>
-        <a:font script="Mong" typeface="Mongolian Baiti"/>
-        <a:font script="Viet" typeface="Times New Roman"/>
-        <a:font script="Uigh" typeface="Microsoft Uighur"/>
-        <a:font script="Geor" typeface="Sylfaen"/>
-      </a:majorFont>
-      <a:minorFont>
-        <a:latin typeface="Arial"/>
-        <a:ea typeface=""/>
-        <a:cs typeface=""/>
-        <a:font script="Jpan" typeface="ＭＳ Ｐゴシック"/>
-        <a:font script="Hang" typeface="맑은 고딕"/>
-        <a:font script="Hans" typeface="宋体"/>
-        <a:font script="Hant" typeface="新細明體"/>
-        <a:font script="Arab" typeface="Arial"/>
-        <a:font script="Hebr" typeface="Arial"/>
-        <a:font script="Thai" typeface="Cordia New"/>
-        <a:font script="Ethi" typeface="Nyala"/>
-        <a:font script="Beng" typeface="Vrinda"/>
-        <a:font script="Gujr" typeface="Shruti"/>
-        <a:font script="Khmr" typeface="DaunPenh"/>
-        <a:font script="Knda" typeface="Tunga"/>
-        <a:font script="Guru" typeface="Raavi"/>
-        <a:font script="Cans" typeface="Euphemia"/>
-        <a:font script="Cher" typeface="Plantagenet Cherokee"/>
-        <a:font script="Yiii" typeface="Microsoft Yi Baiti"/>
-        <a:font script="Tibt" typeface="Microsoft Himalaya"/>
-        <a:font script="Thaa" typeface="MV Boli"/>
-        <a:font script="Deva" typeface="Mangal"/>
-        <a:font script="Telu" typeface="Gautami"/>
-        <a:font script="Taml" typeface="Latha"/>
-        <a:font script="Syrc" typeface="Estrangelo Edessa"/>
-        <a:font script="Orya" typeface="Kalinga"/>
-        <a:font script="Mlym" typeface="Kartika"/>
-        <a:font script="Laoo" typeface="DokChampa"/>
-        <a:font script="Sinh" typeface="Iskoola Pota"/>
-        <a:font script="Mong" typeface="Mongolian Baiti"/>
-        <a:font script="Viet" typeface="Arial"/>
-        <a:font script="Uigh" typeface="Microsoft Uighur"/>
-        <a:font script="Geor" typeface="Sylfaen"/>
-      </a:minorFont>
-    </a:fontScheme>
-    <a:fmtScheme name="Office">
-      <a:fillStyleLst>
-        <a:solidFill>
-          <a:schemeClr val="phClr"/>
-        </a:solidFill>
-        <a:gradFill rotWithShape="1">
-          <a:gsLst>
-            <a:gs pos="0">
-              <a:schemeClr val="phClr">
-                <a:tint val="50000"/>
-                <a:satMod val="300000"/>
-              </a:schemeClr>
-            </a:gs>
-            <a:gs pos="35000">
-              <a:schemeClr val="phClr">
-                <a:tint val="37000"/>
-                <a:satMod val="300000"/>
-              </a:schemeClr>
-            </a:gs>
-            <a:gs pos="100000">
-              <a:schemeClr val="phClr">
-                <a:tint val="15000"/>
-                <a:satMod val="350000"/>
-              </a:schemeClr>
-            </a:gs>
-          </a:gsLst>
-          <a:lin ang="16200000" scaled="1"/>
-        </a:gradFill>
-        <a:gradFill rotWithShape="1">
-          <a:gsLst>
-            <a:gs pos="0">
-              <a:schemeClr val="phClr">
-                <a:tint val="100000"/>
-                <a:shade val="100000"/>
-                <a:satMod val="130000"/>
-              </a:schemeClr>
-            </a:gs>
-            <a:gs pos="100000">
-              <a:schemeClr val="phClr">
-                <a:tint val="50000"/>
-                <a:shade val="100000"/>
-                <a:satMod val="350000"/>
-              </a:schemeClr>
-            </a:gs>
-          </a:gsLst>
-          <a:lin ang="16200000" scaled="0"/>
-        </a:gradFill>
-      </a:fillStyleLst>
-      <a:lnStyleLst>
-        <a:ln w="9525" cap="flat" cmpd="sng" algn="ctr">
-          <a:solidFill>
-            <a:schemeClr val="phClr">
-              <a:shade val="95000"/>
-              <a:satMod val="105000"/>
-            </a:schemeClr>
-          </a:solidFill>
-          <a:prstDash val="solid"/>
-        </a:ln>
-        <a:ln w="25400" cap="flat" cmpd="sng" algn="ctr">
-          <a:solidFill>
-            <a:schemeClr val="phClr"/>
-          </a:solidFill>
-          <a:prstDash val="solid"/>
-        </a:ln>
-        <a:ln w="38100" cap="flat" cmpd="sng" algn="ctr">
-          <a:solidFill>
-            <a:schemeClr val="phClr"/>
-          </a:solidFill>
-          <a:prstDash val="solid"/>
-        </a:ln>
-      </a:lnStyleLst>
-      <a:effectStyleLst>
-        <a:effectStyle>
-          <a:effectLst>
-            <a:outerShdw blurRad="40000" dist="20000" dir="5400000" rotWithShape="0">
-              <a:srgbClr val="000000">
-                <a:alpha val="38000"/>
-              </a:srgbClr>
-            </a:outerShdw>
-          </a:effectLst>
-        </a:effectStyle>
-        <a:effectStyle>
-          <a:effectLst>
-            <a:outerShdw blurRad="40000" dist="23000" dir="5400000" rotWithShape="0">
-              <a:srgbClr val="000000">
-                <a:alpha val="35000"/>
-              </a:srgbClr>
-            </a:outerShdw>
-          </a:effectLst>
-        </a:effectStyle>
-        <a:effectStyle>
-          <a:effectLst>
-            <a:outerShdw blurRad="40000" dist="23000" dir="5400000" rotWithShape="0">
-              <a:srgbClr val="000000">
-                <a:alpha val="35000"/>
-              </a:srgbClr>
-            </a:outerShdw>
-          </a:effectLst>
-          <a:scene3d>
-            <a:camera prst="orthographicFront">
-              <a:rot lat="0" lon="0" rev="0"/>
-            </a:camera>
-            <a:lightRig rig="threePt" dir="t">
-              <a:rot lat="0" lon="0" rev="1200000"/>
-            </a:lightRig>
-          </a:scene3d>
-          <a:sp3d>
-            <a:bevelT w="63500" h="25400"/>
-          </a:sp3d>
-        </a:effectStyle>
-      </a:effectStyleLst>
-      <a:bgFillStyleLst>
-        <a:solidFill>
-          <a:schemeClr val="phClr"/>
-        </a:solidFill>
-        <a:gradFill rotWithShape="1">
-          <a:gsLst>
-            <a:gs pos="0">
-              <a:schemeClr val="phClr">
-                <a:tint val="40000"/>
-                <a:satMod val="350000"/>
-              </a:schemeClr>
-            </a:gs>
-            <a:gs pos="40000">
-              <a:schemeClr val="phClr">
-                <a:tint val="45000"/>
-                <a:shade val="99000"/>
-                <a:satMod val="350000"/>
-              </a:schemeClr>
-            </a:gs>
-            <a:gs pos="100000">
-              <a:schemeClr val="phClr">
-                <a:shade val="20000"/>
-                <a:satMod val="255000"/>
-              </a:schemeClr>
-            </a:gs>
-          </a:gsLst>
-          <a:path path="circle">
-            <a:fillToRect l="50000" t="-80000" r="50000" b="180000"/>
-          </a:path>
-        </a:gradFill>
-        <a:gradFill rotWithShape="1">
-          <a:gsLst>
-            <a:gs pos="0">
-              <a:schemeClr val="phClr">
-                <a:tint val="80000"/>
-                <a:satMod val="300000"/>
-              </a:schemeClr>
-            </a:gs>
-            <a:gs pos="100000">
-              <a:schemeClr val="phClr">
-                <a:shade val="30000"/>
-                <a:satMod val="200000"/>
-              </a:schemeClr>
-            </a:gs>
-          </a:gsLst>
-          <a:path path="circle">
-            <a:fillToRect l="50000" t="50000" r="50000" b="50000"/>
-          </a:path>
-        </a:gradFill>
-      </a:bgFillStyleLst>
-    </a:fmtScheme>
-  </a:themeElements>
-</a:theme>
 </file>
</xml_diff>